<commit_message>
Documentacao FINAL DO PROJETO - PARTE 01
</commit_message>
<xml_diff>
--- a/04-DocumentosDoProjeto/04.2-PPTs/Documento de Testes do Sistema.pptx
+++ b/04-DocumentosDoProjeto/04.2-PPTs/Documento de Testes do Sistema.pptx
@@ -7,9 +7,12 @@
   <p:sldIdLst>
     <p:sldId id="257" r:id="rId2"/>
     <p:sldId id="256" r:id="rId3"/>
-    <p:sldId id="259" r:id="rId4"/>
-    <p:sldId id="260" r:id="rId5"/>
-    <p:sldId id="258" r:id="rId6"/>
+    <p:sldId id="261" r:id="rId4"/>
+    <p:sldId id="259" r:id="rId5"/>
+    <p:sldId id="263" r:id="rId6"/>
+    <p:sldId id="264" r:id="rId7"/>
+    <p:sldId id="260" r:id="rId8"/>
+    <p:sldId id="258" r:id="rId9"/>
   </p:sldIdLst>
   <p:sldSz cx="9144000" cy="6858000" type="screen4x3"/>
   <p:notesSz cx="6858000" cy="9144000"/>
@@ -119,7 +122,7 @@
 <file path=ppt/revisionInfo.xml><?xml version="1.0" encoding="utf-8"?>
 <p1510:revInfo xmlns:a="http://schemas.openxmlformats.org/drawingml/2006/main" xmlns:r="http://schemas.openxmlformats.org/officeDocument/2006/relationships" xmlns:p1510="http://schemas.microsoft.com/office/powerpoint/2015/10/main">
   <p1510:revLst>
-    <p1510:client id="{0754CC29-3A81-40F5-AB6D-2789E4F7DBF7}" v="23" dt="2020-11-26T03:26:09.943"/>
+    <p1510:client id="{0754CC29-3A81-40F5-AB6D-2789E4F7DBF7}" v="41" dt="2020-11-27T13:27:20.728"/>
   </p1510:revLst>
 </p1510:revInfo>
 </file>
@@ -128,8 +131,8 @@
 <pc:chgInfo xmlns:a="http://schemas.openxmlformats.org/drawingml/2006/main" xmlns:r="http://schemas.openxmlformats.org/officeDocument/2006/relationships" xmlns:ac="http://schemas.microsoft.com/office/drawing/2013/main/command" xmlns:pc="http://schemas.microsoft.com/office/powerpoint/2013/main/command">
   <pc:docChgLst>
     <pc:chgData name="Samir Nagib" userId="4f5fd9d0a02b8421" providerId="LiveId" clId="{0754CC29-3A81-40F5-AB6D-2789E4F7DBF7}"/>
-    <pc:docChg chg="undo custSel addSld modSld sldOrd">
-      <pc:chgData name="Samir Nagib" userId="4f5fd9d0a02b8421" providerId="LiveId" clId="{0754CC29-3A81-40F5-AB6D-2789E4F7DBF7}" dt="2020-11-26T03:26:29.418" v="1364" actId="1076"/>
+    <pc:docChg chg="undo custSel addSld delSld modSld sldOrd">
+      <pc:chgData name="Samir Nagib" userId="4f5fd9d0a02b8421" providerId="LiveId" clId="{0754CC29-3A81-40F5-AB6D-2789E4F7DBF7}" dt="2020-11-27T13:28:09.264" v="2429" actId="403"/>
       <pc:docMkLst>
         <pc:docMk/>
       </pc:docMkLst>
@@ -260,7 +263,7 @@
         </pc:picChg>
       </pc:sldChg>
       <pc:sldChg chg="addSp delSp modSp add mod">
-        <pc:chgData name="Samir Nagib" userId="4f5fd9d0a02b8421" providerId="LiveId" clId="{0754CC29-3A81-40F5-AB6D-2789E4F7DBF7}" dt="2020-11-26T03:26:29.418" v="1364" actId="1076"/>
+        <pc:chgData name="Samir Nagib" userId="4f5fd9d0a02b8421" providerId="LiveId" clId="{0754CC29-3A81-40F5-AB6D-2789E4F7DBF7}" dt="2020-11-27T13:28:09.264" v="2429" actId="403"/>
         <pc:sldMkLst>
           <pc:docMk/>
           <pc:sldMk cId="3442297790" sldId="258"/>
@@ -282,7 +285,7 @@
           </ac:spMkLst>
         </pc:spChg>
         <pc:spChg chg="add mod">
-          <ac:chgData name="Samir Nagib" userId="4f5fd9d0a02b8421" providerId="LiveId" clId="{0754CC29-3A81-40F5-AB6D-2789E4F7DBF7}" dt="2020-11-26T03:26:29.418" v="1364" actId="1076"/>
+          <ac:chgData name="Samir Nagib" userId="4f5fd9d0a02b8421" providerId="LiveId" clId="{0754CC29-3A81-40F5-AB6D-2789E4F7DBF7}" dt="2020-11-27T13:28:09.264" v="2429" actId="403"/>
           <ac:spMkLst>
             <pc:docMk/>
             <pc:sldMk cId="3442297790" sldId="258"/>
@@ -299,13 +302,13 @@
         </pc:spChg>
       </pc:sldChg>
       <pc:sldChg chg="addSp delSp modSp add mod">
-        <pc:chgData name="Samir Nagib" userId="4f5fd9d0a02b8421" providerId="LiveId" clId="{0754CC29-3A81-40F5-AB6D-2789E4F7DBF7}" dt="2020-11-26T01:45:08.771" v="1155" actId="6549"/>
+        <pc:chgData name="Samir Nagib" userId="4f5fd9d0a02b8421" providerId="LiveId" clId="{0754CC29-3A81-40F5-AB6D-2789E4F7DBF7}" dt="2020-11-27T13:09:24.018" v="1715" actId="313"/>
         <pc:sldMkLst>
           <pc:docMk/>
           <pc:sldMk cId="1055203194" sldId="259"/>
         </pc:sldMkLst>
-        <pc:spChg chg="mod">
-          <ac:chgData name="Samir Nagib" userId="4f5fd9d0a02b8421" providerId="LiveId" clId="{0754CC29-3A81-40F5-AB6D-2789E4F7DBF7}" dt="2020-11-26T01:37:56.339" v="1055" actId="20577"/>
+        <pc:spChg chg="del mod">
+          <ac:chgData name="Samir Nagib" userId="4f5fd9d0a02b8421" providerId="LiveId" clId="{0754CC29-3A81-40F5-AB6D-2789E4F7DBF7}" dt="2020-11-27T13:03:47.991" v="1406" actId="478"/>
           <ac:spMkLst>
             <pc:docMk/>
             <pc:sldMk cId="1055203194" sldId="259"/>
@@ -321,11 +324,19 @@
           </ac:spMkLst>
         </pc:spChg>
         <pc:spChg chg="mod">
-          <ac:chgData name="Samir Nagib" userId="4f5fd9d0a02b8421" providerId="LiveId" clId="{0754CC29-3A81-40F5-AB6D-2789E4F7DBF7}" dt="2020-11-26T01:38:08.233" v="1057" actId="404"/>
+          <ac:chgData name="Samir Nagib" userId="4f5fd9d0a02b8421" providerId="LiveId" clId="{0754CC29-3A81-40F5-AB6D-2789E4F7DBF7}" dt="2020-11-27T13:04:12.071" v="1409" actId="1076"/>
           <ac:spMkLst>
             <pc:docMk/>
             <pc:sldMk cId="1055203194" sldId="259"/>
             <ac:spMk id="13" creationId="{F4FB8751-C068-4690-A1CE-8DD24E400495}"/>
+          </ac:spMkLst>
+        </pc:spChg>
+        <pc:spChg chg="add mod">
+          <ac:chgData name="Samir Nagib" userId="4f5fd9d0a02b8421" providerId="LiveId" clId="{0754CC29-3A81-40F5-AB6D-2789E4F7DBF7}" dt="2020-11-27T13:09:24.018" v="1715" actId="313"/>
+          <ac:spMkLst>
+            <pc:docMk/>
+            <pc:sldMk cId="1055203194" sldId="259"/>
+            <ac:spMk id="14" creationId="{40F6D25C-69B1-46FF-9AFF-E45927201F26}"/>
           </ac:spMkLst>
         </pc:spChg>
         <pc:spChg chg="del mod">
@@ -361,15 +372,31 @@
           </ac:spMkLst>
         </pc:spChg>
         <pc:spChg chg="add mod">
-          <ac:chgData name="Samir Nagib" userId="4f5fd9d0a02b8421" providerId="LiveId" clId="{0754CC29-3A81-40F5-AB6D-2789E4F7DBF7}" dt="2020-11-26T01:45:08.771" v="1155" actId="6549"/>
+          <ac:chgData name="Samir Nagib" userId="4f5fd9d0a02b8421" providerId="LiveId" clId="{0754CC29-3A81-40F5-AB6D-2789E4F7DBF7}" dt="2020-11-27T13:09:18.652" v="1714" actId="1076"/>
+          <ac:spMkLst>
+            <pc:docMk/>
+            <pc:sldMk cId="1055203194" sldId="259"/>
+            <ac:spMk id="17" creationId="{583E71A0-B03D-4BFA-8639-592C59F4CF52}"/>
+          </ac:spMkLst>
+        </pc:spChg>
+        <pc:spChg chg="add del mod">
+          <ac:chgData name="Samir Nagib" userId="4f5fd9d0a02b8421" providerId="LiveId" clId="{0754CC29-3A81-40F5-AB6D-2789E4F7DBF7}" dt="2020-11-27T13:04:15.385" v="1410" actId="478"/>
           <ac:spMkLst>
             <pc:docMk/>
             <pc:sldMk cId="1055203194" sldId="259"/>
             <ac:spMk id="32" creationId="{77018659-2399-4193-B0CF-FC08F3E123BF}"/>
           </ac:spMkLst>
         </pc:spChg>
+        <pc:graphicFrameChg chg="add mod modGraphic">
+          <ac:chgData name="Samir Nagib" userId="4f5fd9d0a02b8421" providerId="LiveId" clId="{0754CC29-3A81-40F5-AB6D-2789E4F7DBF7}" dt="2020-11-27T13:08:14.756" v="1623" actId="20577"/>
+          <ac:graphicFrameMkLst>
+            <pc:docMk/>
+            <pc:sldMk cId="1055203194" sldId="259"/>
+            <ac:graphicFrameMk id="3" creationId="{EAF21583-3D57-49DB-B499-7D3A84340E56}"/>
+          </ac:graphicFrameMkLst>
+        </pc:graphicFrameChg>
         <pc:picChg chg="add mod">
-          <ac:chgData name="Samir Nagib" userId="4f5fd9d0a02b8421" providerId="LiveId" clId="{0754CC29-3A81-40F5-AB6D-2789E4F7DBF7}" dt="2020-11-26T01:43:37.576" v="1118" actId="14100"/>
+          <ac:chgData name="Samir Nagib" userId="4f5fd9d0a02b8421" providerId="LiveId" clId="{0754CC29-3A81-40F5-AB6D-2789E4F7DBF7}" dt="2020-11-27T13:04:19.399" v="1411" actId="1076"/>
           <ac:picMkLst>
             <pc:docMk/>
             <pc:sldMk cId="1055203194" sldId="259"/>
@@ -377,7 +404,7 @@
           </ac:picMkLst>
         </pc:picChg>
         <pc:picChg chg="add mod">
-          <ac:chgData name="Samir Nagib" userId="4f5fd9d0a02b8421" providerId="LiveId" clId="{0754CC29-3A81-40F5-AB6D-2789E4F7DBF7}" dt="2020-11-26T01:43:44.289" v="1120" actId="14100"/>
+          <ac:chgData name="Samir Nagib" userId="4f5fd9d0a02b8421" providerId="LiveId" clId="{0754CC29-3A81-40F5-AB6D-2789E4F7DBF7}" dt="2020-11-27T13:08:31.444" v="1626" actId="1076"/>
           <ac:picMkLst>
             <pc:docMk/>
             <pc:sldMk cId="1055203194" sldId="259"/>
@@ -385,15 +412,23 @@
           </ac:picMkLst>
         </pc:picChg>
         <pc:picChg chg="add mod">
-          <ac:chgData name="Samir Nagib" userId="4f5fd9d0a02b8421" providerId="LiveId" clId="{0754CC29-3A81-40F5-AB6D-2789E4F7DBF7}" dt="2020-11-26T01:43:53.064" v="1123" actId="14100"/>
+          <ac:chgData name="Samir Nagib" userId="4f5fd9d0a02b8421" providerId="LiveId" clId="{0754CC29-3A81-40F5-AB6D-2789E4F7DBF7}" dt="2020-11-27T13:08:29.381" v="1625" actId="1076"/>
+          <ac:picMkLst>
+            <pc:docMk/>
+            <pc:sldMk cId="1055203194" sldId="259"/>
+            <ac:picMk id="16" creationId="{4433C870-3005-4EAF-8959-D96A0D0AE9A2}"/>
+          </ac:picMkLst>
+        </pc:picChg>
+        <pc:picChg chg="add del mod">
+          <ac:chgData name="Samir Nagib" userId="4f5fd9d0a02b8421" providerId="LiveId" clId="{0754CC29-3A81-40F5-AB6D-2789E4F7DBF7}" dt="2020-11-27T13:03:44.551" v="1405" actId="478"/>
           <ac:picMkLst>
             <pc:docMk/>
             <pc:sldMk cId="1055203194" sldId="259"/>
             <ac:picMk id="19" creationId="{34ADCC67-9E4A-4A8B-9C29-6FD4F0F7BEB3}"/>
           </ac:picMkLst>
         </pc:picChg>
-        <pc:picChg chg="add mod">
-          <ac:chgData name="Samir Nagib" userId="4f5fd9d0a02b8421" providerId="LiveId" clId="{0754CC29-3A81-40F5-AB6D-2789E4F7DBF7}" dt="2020-11-26T01:44:46.866" v="1126" actId="14100"/>
+        <pc:picChg chg="add del mod">
+          <ac:chgData name="Samir Nagib" userId="4f5fd9d0a02b8421" providerId="LiveId" clId="{0754CC29-3A81-40F5-AB6D-2789E4F7DBF7}" dt="2020-11-27T13:03:44.551" v="1405" actId="478"/>
           <ac:picMkLst>
             <pc:docMk/>
             <pc:sldMk cId="1055203194" sldId="259"/>
@@ -442,25 +477,65 @@
         </pc:picChg>
       </pc:sldChg>
       <pc:sldChg chg="addSp delSp modSp add mod">
-        <pc:chgData name="Samir Nagib" userId="4f5fd9d0a02b8421" providerId="LiveId" clId="{0754CC29-3A81-40F5-AB6D-2789E4F7DBF7}" dt="2020-11-26T01:47:05.027" v="1183" actId="207"/>
+        <pc:chgData name="Samir Nagib" userId="4f5fd9d0a02b8421" providerId="LiveId" clId="{0754CC29-3A81-40F5-AB6D-2789E4F7DBF7}" dt="2020-11-27T13:27:51.148" v="2427" actId="1076"/>
         <pc:sldMkLst>
           <pc:docMk/>
           <pc:sldMk cId="645063726" sldId="260"/>
         </pc:sldMkLst>
+        <pc:spChg chg="del">
+          <ac:chgData name="Samir Nagib" userId="4f5fd9d0a02b8421" providerId="LiveId" clId="{0754CC29-3A81-40F5-AB6D-2789E4F7DBF7}" dt="2020-11-27T13:26:29.836" v="2385" actId="478"/>
+          <ac:spMkLst>
+            <pc:docMk/>
+            <pc:sldMk cId="645063726" sldId="260"/>
+            <ac:spMk id="2" creationId="{9D038FE3-9B74-4232-B802-7857509E6E8E}"/>
+          </ac:spMkLst>
+        </pc:spChg>
         <pc:spChg chg="add mod">
-          <ac:chgData name="Samir Nagib" userId="4f5fd9d0a02b8421" providerId="LiveId" clId="{0754CC29-3A81-40F5-AB6D-2789E4F7DBF7}" dt="2020-11-26T01:46:28.545" v="1174" actId="207"/>
+          <ac:chgData name="Samir Nagib" userId="4f5fd9d0a02b8421" providerId="LiveId" clId="{0754CC29-3A81-40F5-AB6D-2789E4F7DBF7}" dt="2020-11-27T13:26:56.596" v="2391" actId="1076"/>
           <ac:spMkLst>
             <pc:docMk/>
             <pc:sldMk cId="645063726" sldId="260"/>
             <ac:spMk id="12" creationId="{CA0C3395-06F6-431F-A2C7-4813A9A1C004}"/>
           </ac:spMkLst>
         </pc:spChg>
-        <pc:spChg chg="add mod">
-          <ac:chgData name="Samir Nagib" userId="4f5fd9d0a02b8421" providerId="LiveId" clId="{0754CC29-3A81-40F5-AB6D-2789E4F7DBF7}" dt="2020-11-26T01:45:35.531" v="1168" actId="1076"/>
+        <pc:spChg chg="del mod">
+          <ac:chgData name="Samir Nagib" userId="4f5fd9d0a02b8421" providerId="LiveId" clId="{0754CC29-3A81-40F5-AB6D-2789E4F7DBF7}" dt="2020-11-27T13:26:27.100" v="2384" actId="478"/>
+          <ac:spMkLst>
+            <pc:docMk/>
+            <pc:sldMk cId="645063726" sldId="260"/>
+            <ac:spMk id="13" creationId="{F4FB8751-C068-4690-A1CE-8DD24E400495}"/>
+          </ac:spMkLst>
+        </pc:spChg>
+        <pc:spChg chg="add del mod">
+          <ac:chgData name="Samir Nagib" userId="4f5fd9d0a02b8421" providerId="LiveId" clId="{0754CC29-3A81-40F5-AB6D-2789E4F7DBF7}" dt="2020-11-27T13:26:46.732" v="2388" actId="478"/>
+          <ac:spMkLst>
+            <pc:docMk/>
+            <pc:sldMk cId="645063726" sldId="260"/>
+            <ac:spMk id="19" creationId="{5E4AFD84-B758-437E-A6AF-3655905AFE64}"/>
+          </ac:spMkLst>
+        </pc:spChg>
+        <pc:spChg chg="add del mod">
+          <ac:chgData name="Samir Nagib" userId="4f5fd9d0a02b8421" providerId="LiveId" clId="{0754CC29-3A81-40F5-AB6D-2789E4F7DBF7}" dt="2020-11-27T13:26:37.692" v="2387" actId="478"/>
           <ac:spMkLst>
             <pc:docMk/>
             <pc:sldMk cId="645063726" sldId="260"/>
             <ac:spMk id="20" creationId="{C8D1DB92-AC4B-4A26-8D8B-BA8636A0F70E}"/>
+          </ac:spMkLst>
+        </pc:spChg>
+        <pc:spChg chg="add mod">
+          <ac:chgData name="Samir Nagib" userId="4f5fd9d0a02b8421" providerId="LiveId" clId="{0754CC29-3A81-40F5-AB6D-2789E4F7DBF7}" dt="2020-11-27T13:26:31.371" v="2386"/>
+          <ac:spMkLst>
+            <pc:docMk/>
+            <pc:sldMk cId="645063726" sldId="260"/>
+            <ac:spMk id="21" creationId="{700DDE85-568A-4210-A9CD-5DAD43EB4230}"/>
+          </ac:spMkLst>
+        </pc:spChg>
+        <pc:spChg chg="add mod">
+          <ac:chgData name="Samir Nagib" userId="4f5fd9d0a02b8421" providerId="LiveId" clId="{0754CC29-3A81-40F5-AB6D-2789E4F7DBF7}" dt="2020-11-27T13:27:44.244" v="2425" actId="1076"/>
+          <ac:spMkLst>
+            <pc:docMk/>
+            <pc:sldMk cId="645063726" sldId="260"/>
+            <ac:spMk id="22" creationId="{95F5A04D-F071-4C80-82BD-B515443AB3A3}"/>
           </ac:spMkLst>
         </pc:spChg>
         <pc:spChg chg="add mod">
@@ -469,6 +544,14 @@
             <pc:docMk/>
             <pc:sldMk cId="645063726" sldId="260"/>
             <ac:spMk id="26" creationId="{2F4E24FF-BAAB-4EB2-A6BE-15886F3A07FA}"/>
+          </ac:spMkLst>
+        </pc:spChg>
+        <pc:spChg chg="add mod">
+          <ac:chgData name="Samir Nagib" userId="4f5fd9d0a02b8421" providerId="LiveId" clId="{0754CC29-3A81-40F5-AB6D-2789E4F7DBF7}" dt="2020-11-27T13:27:48.644" v="2426" actId="1076"/>
+          <ac:spMkLst>
+            <pc:docMk/>
+            <pc:sldMk cId="645063726" sldId="260"/>
+            <ac:spMk id="28" creationId="{E6B6F49E-FE92-4741-94A1-94DA44DC4485}"/>
           </ac:spMkLst>
         </pc:spChg>
         <pc:picChg chg="del">
@@ -512,7 +595,7 @@
           </ac:picMkLst>
         </pc:picChg>
         <pc:picChg chg="mod">
-          <ac:chgData name="Samir Nagib" userId="4f5fd9d0a02b8421" providerId="LiveId" clId="{0754CC29-3A81-40F5-AB6D-2789E4F7DBF7}" dt="2020-11-26T01:43:23.072" v="1115" actId="1076"/>
+          <ac:chgData name="Samir Nagib" userId="4f5fd9d0a02b8421" providerId="LiveId" clId="{0754CC29-3A81-40F5-AB6D-2789E4F7DBF7}" dt="2020-11-27T13:27:04.619" v="2393" actId="1076"/>
           <ac:picMkLst>
             <pc:docMk/>
             <pc:sldMk cId="645063726" sldId="260"/>
@@ -520,7 +603,7 @@
           </ac:picMkLst>
         </pc:picChg>
         <pc:picChg chg="mod">
-          <ac:chgData name="Samir Nagib" userId="4f5fd9d0a02b8421" providerId="LiveId" clId="{0754CC29-3A81-40F5-AB6D-2789E4F7DBF7}" dt="2020-11-26T01:42:55.263" v="1108" actId="14100"/>
+          <ac:chgData name="Samir Nagib" userId="4f5fd9d0a02b8421" providerId="LiveId" clId="{0754CC29-3A81-40F5-AB6D-2789E4F7DBF7}" dt="2020-11-27T13:26:50.003" v="2389" actId="1076"/>
           <ac:picMkLst>
             <pc:docMk/>
             <pc:sldMk cId="645063726" sldId="260"/>
@@ -528,7 +611,7 @@
           </ac:picMkLst>
         </pc:picChg>
         <pc:picChg chg="mod">
-          <ac:chgData name="Samir Nagib" userId="4f5fd9d0a02b8421" providerId="LiveId" clId="{0754CC29-3A81-40F5-AB6D-2789E4F7DBF7}" dt="2020-11-26T01:43:09.512" v="1111" actId="14100"/>
+          <ac:chgData name="Samir Nagib" userId="4f5fd9d0a02b8421" providerId="LiveId" clId="{0754CC29-3A81-40F5-AB6D-2789E4F7DBF7}" dt="2020-11-27T13:26:51.587" v="2390" actId="1076"/>
           <ac:picMkLst>
             <pc:docMk/>
             <pc:sldMk cId="645063726" sldId="260"/>
@@ -544,7 +627,7 @@
           </ac:picMkLst>
         </pc:picChg>
         <pc:picChg chg="mod">
-          <ac:chgData name="Samir Nagib" userId="4f5fd9d0a02b8421" providerId="LiveId" clId="{0754CC29-3A81-40F5-AB6D-2789E4F7DBF7}" dt="2020-11-26T01:43:18.160" v="1114" actId="1076"/>
+          <ac:chgData name="Samir Nagib" userId="4f5fd9d0a02b8421" providerId="LiveId" clId="{0754CC29-3A81-40F5-AB6D-2789E4F7DBF7}" dt="2020-11-27T13:27:51.148" v="2427" actId="1076"/>
           <ac:picMkLst>
             <pc:docMk/>
             <pc:sldMk cId="645063726" sldId="260"/>
@@ -565,6 +648,306 @@
             <pc:docMk/>
             <pc:sldMk cId="645063726" sldId="260"/>
             <ac:cxnSpMk id="24" creationId="{F7A2E808-C9A5-448E-A7E8-14A4DD9A2C4A}"/>
+          </ac:cxnSpMkLst>
+        </pc:cxnChg>
+      </pc:sldChg>
+      <pc:sldChg chg="delSp modSp add mod ord">
+        <pc:chgData name="Samir Nagib" userId="4f5fd9d0a02b8421" providerId="LiveId" clId="{0754CC29-3A81-40F5-AB6D-2789E4F7DBF7}" dt="2020-11-27T13:03:00.600" v="1370"/>
+        <pc:sldMkLst>
+          <pc:docMk/>
+          <pc:sldMk cId="1778661698" sldId="261"/>
+        </pc:sldMkLst>
+        <pc:spChg chg="mod">
+          <ac:chgData name="Samir Nagib" userId="4f5fd9d0a02b8421" providerId="LiveId" clId="{0754CC29-3A81-40F5-AB6D-2789E4F7DBF7}" dt="2020-11-27T13:02:50.846" v="1368" actId="1076"/>
+          <ac:spMkLst>
+            <pc:docMk/>
+            <pc:sldMk cId="1778661698" sldId="261"/>
+            <ac:spMk id="2" creationId="{9D038FE3-9B74-4232-B802-7857509E6E8E}"/>
+          </ac:spMkLst>
+        </pc:spChg>
+        <pc:spChg chg="mod">
+          <ac:chgData name="Samir Nagib" userId="4f5fd9d0a02b8421" providerId="LiveId" clId="{0754CC29-3A81-40F5-AB6D-2789E4F7DBF7}" dt="2020-11-27T13:02:46.895" v="1367" actId="1076"/>
+          <ac:spMkLst>
+            <pc:docMk/>
+            <pc:sldMk cId="1778661698" sldId="261"/>
+            <ac:spMk id="13" creationId="{F4FB8751-C068-4690-A1CE-8DD24E400495}"/>
+          </ac:spMkLst>
+        </pc:spChg>
+        <pc:spChg chg="del">
+          <ac:chgData name="Samir Nagib" userId="4f5fd9d0a02b8421" providerId="LiveId" clId="{0754CC29-3A81-40F5-AB6D-2789E4F7DBF7}" dt="2020-11-27T13:02:40.545" v="1366" actId="478"/>
+          <ac:spMkLst>
+            <pc:docMk/>
+            <pc:sldMk cId="1778661698" sldId="261"/>
+            <ac:spMk id="32" creationId="{77018659-2399-4193-B0CF-FC08F3E123BF}"/>
+          </ac:spMkLst>
+        </pc:spChg>
+        <pc:picChg chg="del">
+          <ac:chgData name="Samir Nagib" userId="4f5fd9d0a02b8421" providerId="LiveId" clId="{0754CC29-3A81-40F5-AB6D-2789E4F7DBF7}" dt="2020-11-27T13:02:40.545" v="1366" actId="478"/>
+          <ac:picMkLst>
+            <pc:docMk/>
+            <pc:sldMk cId="1778661698" sldId="261"/>
+            <ac:picMk id="4" creationId="{9FFB4A73-1E71-41CB-9FDB-A938FD46B90E}"/>
+          </ac:picMkLst>
+        </pc:picChg>
+        <pc:picChg chg="del">
+          <ac:chgData name="Samir Nagib" userId="4f5fd9d0a02b8421" providerId="LiveId" clId="{0754CC29-3A81-40F5-AB6D-2789E4F7DBF7}" dt="2020-11-27T13:02:40.545" v="1366" actId="478"/>
+          <ac:picMkLst>
+            <pc:docMk/>
+            <pc:sldMk cId="1778661698" sldId="261"/>
+            <ac:picMk id="6" creationId="{8E8E180E-9949-4B05-9D33-ECB556BEDC17}"/>
+          </ac:picMkLst>
+        </pc:picChg>
+        <pc:picChg chg="del">
+          <ac:chgData name="Samir Nagib" userId="4f5fd9d0a02b8421" providerId="LiveId" clId="{0754CC29-3A81-40F5-AB6D-2789E4F7DBF7}" dt="2020-11-27T13:02:40.545" v="1366" actId="478"/>
+          <ac:picMkLst>
+            <pc:docMk/>
+            <pc:sldMk cId="1778661698" sldId="261"/>
+            <ac:picMk id="19" creationId="{34ADCC67-9E4A-4A8B-9C29-6FD4F0F7BEB3}"/>
+          </ac:picMkLst>
+        </pc:picChg>
+        <pc:picChg chg="del">
+          <ac:chgData name="Samir Nagib" userId="4f5fd9d0a02b8421" providerId="LiveId" clId="{0754CC29-3A81-40F5-AB6D-2789E4F7DBF7}" dt="2020-11-27T13:02:40.545" v="1366" actId="478"/>
+          <ac:picMkLst>
+            <pc:docMk/>
+            <pc:sldMk cId="1778661698" sldId="261"/>
+            <ac:picMk id="21" creationId="{81BE0C9B-F798-4834-B634-4CD0A4987D30}"/>
+          </ac:picMkLst>
+        </pc:picChg>
+      </pc:sldChg>
+      <pc:sldChg chg="add del">
+        <pc:chgData name="Samir Nagib" userId="4f5fd9d0a02b8421" providerId="LiveId" clId="{0754CC29-3A81-40F5-AB6D-2789E4F7DBF7}" dt="2020-11-27T13:15:05.167" v="1893" actId="2696"/>
+        <pc:sldMkLst>
+          <pc:docMk/>
+          <pc:sldMk cId="1945753459" sldId="262"/>
+        </pc:sldMkLst>
+      </pc:sldChg>
+      <pc:sldChg chg="addSp delSp modSp add mod">
+        <pc:chgData name="Samir Nagib" userId="4f5fd9d0a02b8421" providerId="LiveId" clId="{0754CC29-3A81-40F5-AB6D-2789E4F7DBF7}" dt="2020-11-27T13:14:37.489" v="1889" actId="2165"/>
+        <pc:sldMkLst>
+          <pc:docMk/>
+          <pc:sldMk cId="1417587163" sldId="263"/>
+        </pc:sldMkLst>
+        <pc:spChg chg="mod">
+          <ac:chgData name="Samir Nagib" userId="4f5fd9d0a02b8421" providerId="LiveId" clId="{0754CC29-3A81-40F5-AB6D-2789E4F7DBF7}" dt="2020-11-27T13:10:05.342" v="1723" actId="20577"/>
+          <ac:spMkLst>
+            <pc:docMk/>
+            <pc:sldMk cId="1417587163" sldId="263"/>
+            <ac:spMk id="14" creationId="{40F6D25C-69B1-46FF-9AFF-E45927201F26}"/>
+          </ac:spMkLst>
+        </pc:spChg>
+        <pc:spChg chg="mod">
+          <ac:chgData name="Samir Nagib" userId="4f5fd9d0a02b8421" providerId="LiveId" clId="{0754CC29-3A81-40F5-AB6D-2789E4F7DBF7}" dt="2020-11-27T13:14:16.290" v="1887" actId="20577"/>
+          <ac:spMkLst>
+            <pc:docMk/>
+            <pc:sldMk cId="1417587163" sldId="263"/>
+            <ac:spMk id="17" creationId="{583E71A0-B03D-4BFA-8639-592C59F4CF52}"/>
+          </ac:spMkLst>
+        </pc:spChg>
+        <pc:graphicFrameChg chg="modGraphic">
+          <ac:chgData name="Samir Nagib" userId="4f5fd9d0a02b8421" providerId="LiveId" clId="{0754CC29-3A81-40F5-AB6D-2789E4F7DBF7}" dt="2020-11-27T13:14:37.489" v="1889" actId="2165"/>
+          <ac:graphicFrameMkLst>
+            <pc:docMk/>
+            <pc:sldMk cId="1417587163" sldId="263"/>
+            <ac:graphicFrameMk id="3" creationId="{EAF21583-3D57-49DB-B499-7D3A84340E56}"/>
+          </ac:graphicFrameMkLst>
+        </pc:graphicFrameChg>
+        <pc:picChg chg="mod">
+          <ac:chgData name="Samir Nagib" userId="4f5fd9d0a02b8421" providerId="LiveId" clId="{0754CC29-3A81-40F5-AB6D-2789E4F7DBF7}" dt="2020-11-27T13:12:22.230" v="1737" actId="14100"/>
+          <ac:picMkLst>
+            <pc:docMk/>
+            <pc:sldMk cId="1417587163" sldId="263"/>
+            <ac:picMk id="4" creationId="{9FFB4A73-1E71-41CB-9FDB-A938FD46B90E}"/>
+          </ac:picMkLst>
+        </pc:picChg>
+        <pc:picChg chg="add del mod">
+          <ac:chgData name="Samir Nagib" userId="4f5fd9d0a02b8421" providerId="LiveId" clId="{0754CC29-3A81-40F5-AB6D-2789E4F7DBF7}" dt="2020-11-27T13:12:00.125" v="1731" actId="478"/>
+          <ac:picMkLst>
+            <pc:docMk/>
+            <pc:sldMk cId="1417587163" sldId="263"/>
+            <ac:picMk id="5" creationId="{86055227-703D-42C4-A4E9-C07C1B2B4200}"/>
+          </ac:picMkLst>
+        </pc:picChg>
+        <pc:picChg chg="del mod">
+          <ac:chgData name="Samir Nagib" userId="4f5fd9d0a02b8421" providerId="LiveId" clId="{0754CC29-3A81-40F5-AB6D-2789E4F7DBF7}" dt="2020-11-27T13:10:11.637" v="1725" actId="478"/>
+          <ac:picMkLst>
+            <pc:docMk/>
+            <pc:sldMk cId="1417587163" sldId="263"/>
+            <ac:picMk id="6" creationId="{8E8E180E-9949-4B05-9D33-ECB556BEDC17}"/>
+          </ac:picMkLst>
+        </pc:picChg>
+        <pc:picChg chg="add mod">
+          <ac:chgData name="Samir Nagib" userId="4f5fd9d0a02b8421" providerId="LiveId" clId="{0754CC29-3A81-40F5-AB6D-2789E4F7DBF7}" dt="2020-11-27T13:12:18.142" v="1735" actId="1076"/>
+          <ac:picMkLst>
+            <pc:docMk/>
+            <pc:sldMk cId="1417587163" sldId="263"/>
+            <ac:picMk id="15" creationId="{73AAB232-6DDA-4D7B-A608-577832BA466C}"/>
+          </ac:picMkLst>
+        </pc:picChg>
+        <pc:picChg chg="del">
+          <ac:chgData name="Samir Nagib" userId="4f5fd9d0a02b8421" providerId="LiveId" clId="{0754CC29-3A81-40F5-AB6D-2789E4F7DBF7}" dt="2020-11-27T13:10:11.637" v="1725" actId="478"/>
+          <ac:picMkLst>
+            <pc:docMk/>
+            <pc:sldMk cId="1417587163" sldId="263"/>
+            <ac:picMk id="16" creationId="{4433C870-3005-4EAF-8959-D96A0D0AE9A2}"/>
+          </ac:picMkLst>
+        </pc:picChg>
+        <pc:picChg chg="add mod">
+          <ac:chgData name="Samir Nagib" userId="4f5fd9d0a02b8421" providerId="LiveId" clId="{0754CC29-3A81-40F5-AB6D-2789E4F7DBF7}" dt="2020-11-27T13:13:26.386" v="1805" actId="1076"/>
+          <ac:picMkLst>
+            <pc:docMk/>
+            <pc:sldMk cId="1417587163" sldId="263"/>
+            <ac:picMk id="18" creationId="{C9D07C7B-C3C3-47CC-8482-92DF9C8FD128}"/>
+          </ac:picMkLst>
+        </pc:picChg>
+      </pc:sldChg>
+      <pc:sldChg chg="addSp delSp modSp add mod ord">
+        <pc:chgData name="Samir Nagib" userId="4f5fd9d0a02b8421" providerId="LiveId" clId="{0754CC29-3A81-40F5-AB6D-2789E4F7DBF7}" dt="2020-11-27T13:26:11.268" v="2382" actId="1076"/>
+        <pc:sldMkLst>
+          <pc:docMk/>
+          <pc:sldMk cId="3754633359" sldId="264"/>
+        </pc:sldMkLst>
+        <pc:spChg chg="mod">
+          <ac:chgData name="Samir Nagib" userId="4f5fd9d0a02b8421" providerId="LiveId" clId="{0754CC29-3A81-40F5-AB6D-2789E4F7DBF7}" dt="2020-11-27T13:24:31.306" v="2339" actId="1076"/>
+          <ac:spMkLst>
+            <pc:docMk/>
+            <pc:sldMk cId="3754633359" sldId="264"/>
+            <ac:spMk id="13" creationId="{F4FB8751-C068-4690-A1CE-8DD24E400495}"/>
+          </ac:spMkLst>
+        </pc:spChg>
+        <pc:spChg chg="mod">
+          <ac:chgData name="Samir Nagib" userId="4f5fd9d0a02b8421" providerId="LiveId" clId="{0754CC29-3A81-40F5-AB6D-2789E4F7DBF7}" dt="2020-11-27T13:24:28.169" v="2338" actId="1076"/>
+          <ac:spMkLst>
+            <pc:docMk/>
+            <pc:sldMk cId="3754633359" sldId="264"/>
+            <ac:spMk id="14" creationId="{40F6D25C-69B1-46FF-9AFF-E45927201F26}"/>
+          </ac:spMkLst>
+        </pc:spChg>
+        <pc:spChg chg="del mod">
+          <ac:chgData name="Samir Nagib" userId="4f5fd9d0a02b8421" providerId="LiveId" clId="{0754CC29-3A81-40F5-AB6D-2789E4F7DBF7}" dt="2020-11-27T13:24:42.778" v="2342" actId="478"/>
+          <ac:spMkLst>
+            <pc:docMk/>
+            <pc:sldMk cId="3754633359" sldId="264"/>
+            <ac:spMk id="17" creationId="{583E71A0-B03D-4BFA-8639-592C59F4CF52}"/>
+          </ac:spMkLst>
+        </pc:spChg>
+        <pc:spChg chg="add del mod">
+          <ac:chgData name="Samir Nagib" userId="4f5fd9d0a02b8421" providerId="LiveId" clId="{0754CC29-3A81-40F5-AB6D-2789E4F7DBF7}" dt="2020-11-27T13:25:27.910" v="2348"/>
+          <ac:spMkLst>
+            <pc:docMk/>
+            <pc:sldMk cId="3754633359" sldId="264"/>
+            <ac:spMk id="23" creationId="{3FB153EA-3264-4E0F-B708-326442681D54}"/>
+          </ac:spMkLst>
+        </pc:spChg>
+        <pc:spChg chg="add del mod">
+          <ac:chgData name="Samir Nagib" userId="4f5fd9d0a02b8421" providerId="LiveId" clId="{0754CC29-3A81-40F5-AB6D-2789E4F7DBF7}" dt="2020-11-27T13:25:27.910" v="2348"/>
+          <ac:spMkLst>
+            <pc:docMk/>
+            <pc:sldMk cId="3754633359" sldId="264"/>
+            <ac:spMk id="25" creationId="{C1011923-51BE-442F-95FF-571C9DF049AF}"/>
+          </ac:spMkLst>
+        </pc:spChg>
+        <pc:spChg chg="add del mod">
+          <ac:chgData name="Samir Nagib" userId="4f5fd9d0a02b8421" providerId="LiveId" clId="{0754CC29-3A81-40F5-AB6D-2789E4F7DBF7}" dt="2020-11-27T13:25:27.910" v="2348"/>
+          <ac:spMkLst>
+            <pc:docMk/>
+            <pc:sldMk cId="3754633359" sldId="264"/>
+            <ac:spMk id="27" creationId="{3515A236-D10E-494C-AE72-D34F1CB8393B}"/>
+          </ac:spMkLst>
+        </pc:spChg>
+        <pc:spChg chg="add mod">
+          <ac:chgData name="Samir Nagib" userId="4f5fd9d0a02b8421" providerId="LiveId" clId="{0754CC29-3A81-40F5-AB6D-2789E4F7DBF7}" dt="2020-11-27T13:26:11.268" v="2382" actId="1076"/>
+          <ac:spMkLst>
+            <pc:docMk/>
+            <pc:sldMk cId="3754633359" sldId="264"/>
+            <ac:spMk id="28" creationId="{C0759B8E-A777-4699-93F2-017B70F76493}"/>
+          </ac:spMkLst>
+        </pc:spChg>
+        <pc:graphicFrameChg chg="mod modGraphic">
+          <ac:chgData name="Samir Nagib" userId="4f5fd9d0a02b8421" providerId="LiveId" clId="{0754CC29-3A81-40F5-AB6D-2789E4F7DBF7}" dt="2020-11-27T13:24:34.577" v="2340" actId="1076"/>
+          <ac:graphicFrameMkLst>
+            <pc:docMk/>
+            <pc:sldMk cId="3754633359" sldId="264"/>
+            <ac:graphicFrameMk id="3" creationId="{EAF21583-3D57-49DB-B499-7D3A84340E56}"/>
+          </ac:graphicFrameMkLst>
+        </pc:graphicFrameChg>
+        <pc:picChg chg="add mod">
+          <ac:chgData name="Samir Nagib" userId="4f5fd9d0a02b8421" providerId="LiveId" clId="{0754CC29-3A81-40F5-AB6D-2789E4F7DBF7}" dt="2020-11-27T13:25:32.642" v="2349" actId="1076"/>
+          <ac:picMkLst>
+            <pc:docMk/>
+            <pc:sldMk cId="3754633359" sldId="264"/>
+            <ac:picMk id="5" creationId="{32FE6840-4C47-4726-9CFA-C1DF5827D2FE}"/>
+          </ac:picMkLst>
+        </pc:picChg>
+        <pc:picChg chg="del">
+          <ac:chgData name="Samir Nagib" userId="4f5fd9d0a02b8421" providerId="LiveId" clId="{0754CC29-3A81-40F5-AB6D-2789E4F7DBF7}" dt="2020-11-27T13:16:55.043" v="1972" actId="478"/>
+          <ac:picMkLst>
+            <pc:docMk/>
+            <pc:sldMk cId="3754633359" sldId="264"/>
+            <ac:picMk id="6" creationId="{8E8E180E-9949-4B05-9D33-ECB556BEDC17}"/>
+          </ac:picMkLst>
+        </pc:picChg>
+        <pc:picChg chg="del mod">
+          <ac:chgData name="Samir Nagib" userId="4f5fd9d0a02b8421" providerId="LiveId" clId="{0754CC29-3A81-40F5-AB6D-2789E4F7DBF7}" dt="2020-11-27T13:17:20.251" v="1976" actId="478"/>
+          <ac:picMkLst>
+            <pc:docMk/>
+            <pc:sldMk cId="3754633359" sldId="264"/>
+            <ac:picMk id="16" creationId="{4433C870-3005-4EAF-8959-D96A0D0AE9A2}"/>
+          </ac:picMkLst>
+        </pc:picChg>
+        <pc:picChg chg="add del mod">
+          <ac:chgData name="Samir Nagib" userId="4f5fd9d0a02b8421" providerId="LiveId" clId="{0754CC29-3A81-40F5-AB6D-2789E4F7DBF7}" dt="2020-11-27T13:25:27.910" v="2348"/>
+          <ac:picMkLst>
+            <pc:docMk/>
+            <pc:sldMk cId="3754633359" sldId="264"/>
+            <ac:picMk id="18" creationId="{54A3E2F8-B7B9-4006-A65C-0CC019EBA32A}"/>
+          </ac:picMkLst>
+        </pc:picChg>
+        <pc:picChg chg="add del mod">
+          <ac:chgData name="Samir Nagib" userId="4f5fd9d0a02b8421" providerId="LiveId" clId="{0754CC29-3A81-40F5-AB6D-2789E4F7DBF7}" dt="2020-11-27T13:25:27.910" v="2348"/>
+          <ac:picMkLst>
+            <pc:docMk/>
+            <pc:sldMk cId="3754633359" sldId="264"/>
+            <ac:picMk id="19" creationId="{CFD2AEC9-F47C-457D-B157-9667CC119780}"/>
+          </ac:picMkLst>
+        </pc:picChg>
+        <pc:picChg chg="add del mod">
+          <ac:chgData name="Samir Nagib" userId="4f5fd9d0a02b8421" providerId="LiveId" clId="{0754CC29-3A81-40F5-AB6D-2789E4F7DBF7}" dt="2020-11-27T13:25:27.910" v="2348"/>
+          <ac:picMkLst>
+            <pc:docMk/>
+            <pc:sldMk cId="3754633359" sldId="264"/>
+            <ac:picMk id="20" creationId="{A99292B5-B670-4369-95DB-0A31680C145F}"/>
+          </ac:picMkLst>
+        </pc:picChg>
+        <pc:picChg chg="add del mod">
+          <ac:chgData name="Samir Nagib" userId="4f5fd9d0a02b8421" providerId="LiveId" clId="{0754CC29-3A81-40F5-AB6D-2789E4F7DBF7}" dt="2020-11-27T13:25:27.910" v="2348"/>
+          <ac:picMkLst>
+            <pc:docMk/>
+            <pc:sldMk cId="3754633359" sldId="264"/>
+            <ac:picMk id="21" creationId="{B0DFFFDC-EEBF-4C10-A57A-B084A7E2D3EA}"/>
+          </ac:picMkLst>
+        </pc:picChg>
+        <pc:picChg chg="add del mod">
+          <ac:chgData name="Samir Nagib" userId="4f5fd9d0a02b8421" providerId="LiveId" clId="{0754CC29-3A81-40F5-AB6D-2789E4F7DBF7}" dt="2020-11-27T13:25:27.910" v="2348"/>
+          <ac:picMkLst>
+            <pc:docMk/>
+            <pc:sldMk cId="3754633359" sldId="264"/>
+            <ac:picMk id="22" creationId="{75A91289-89B4-4C32-A9B1-E3B1C4CD57C8}"/>
+          </ac:picMkLst>
+        </pc:picChg>
+        <pc:cxnChg chg="add del mod">
+          <ac:chgData name="Samir Nagib" userId="4f5fd9d0a02b8421" providerId="LiveId" clId="{0754CC29-3A81-40F5-AB6D-2789E4F7DBF7}" dt="2020-11-27T13:25:27.910" v="2348"/>
+          <ac:cxnSpMkLst>
+            <pc:docMk/>
+            <pc:sldMk cId="3754633359" sldId="264"/>
+            <ac:cxnSpMk id="24" creationId="{813CF3C0-FC49-401D-BF03-C895257935B3}"/>
+          </ac:cxnSpMkLst>
+        </pc:cxnChg>
+        <pc:cxnChg chg="add del mod">
+          <ac:chgData name="Samir Nagib" userId="4f5fd9d0a02b8421" providerId="LiveId" clId="{0754CC29-3A81-40F5-AB6D-2789E4F7DBF7}" dt="2020-11-27T13:25:27.910" v="2348"/>
+          <ac:cxnSpMkLst>
+            <pc:docMk/>
+            <pc:sldMk cId="3754633359" sldId="264"/>
+            <ac:cxnSpMk id="26" creationId="{38F99F68-6361-426B-8CBC-38D76D5C7C97}"/>
           </ac:cxnSpMkLst>
         </pc:cxnChg>
       </pc:sldChg>
@@ -704,7 +1087,7 @@
           <a:p>
             <a:fld id="{1C371D64-64F3-4BCF-AF6C-AF00FD032500}" type="datetimeFigureOut">
               <a:rPr lang="pt-BR" smtClean="0"/>
-              <a:t>25/11/2020</a:t>
+              <a:t>27/11/2020</a:t>
             </a:fld>
             <a:endParaRPr lang="pt-BR"/>
           </a:p>
@@ -874,7 +1257,7 @@
           <a:p>
             <a:fld id="{1C371D64-64F3-4BCF-AF6C-AF00FD032500}" type="datetimeFigureOut">
               <a:rPr lang="pt-BR" smtClean="0"/>
-              <a:t>25/11/2020</a:t>
+              <a:t>27/11/2020</a:t>
             </a:fld>
             <a:endParaRPr lang="pt-BR"/>
           </a:p>
@@ -1054,7 +1437,7 @@
           <a:p>
             <a:fld id="{1C371D64-64F3-4BCF-AF6C-AF00FD032500}" type="datetimeFigureOut">
               <a:rPr lang="pt-BR" smtClean="0"/>
-              <a:t>25/11/2020</a:t>
+              <a:t>27/11/2020</a:t>
             </a:fld>
             <a:endParaRPr lang="pt-BR"/>
           </a:p>
@@ -1224,7 +1607,7 @@
           <a:p>
             <a:fld id="{1C371D64-64F3-4BCF-AF6C-AF00FD032500}" type="datetimeFigureOut">
               <a:rPr lang="pt-BR" smtClean="0"/>
-              <a:t>25/11/2020</a:t>
+              <a:t>27/11/2020</a:t>
             </a:fld>
             <a:endParaRPr lang="pt-BR"/>
           </a:p>
@@ -1468,7 +1851,7 @@
           <a:p>
             <a:fld id="{1C371D64-64F3-4BCF-AF6C-AF00FD032500}" type="datetimeFigureOut">
               <a:rPr lang="pt-BR" smtClean="0"/>
-              <a:t>25/11/2020</a:t>
+              <a:t>27/11/2020</a:t>
             </a:fld>
             <a:endParaRPr lang="pt-BR"/>
           </a:p>
@@ -1700,7 +2083,7 @@
           <a:p>
             <a:fld id="{1C371D64-64F3-4BCF-AF6C-AF00FD032500}" type="datetimeFigureOut">
               <a:rPr lang="pt-BR" smtClean="0"/>
-              <a:t>25/11/2020</a:t>
+              <a:t>27/11/2020</a:t>
             </a:fld>
             <a:endParaRPr lang="pt-BR"/>
           </a:p>
@@ -2067,7 +2450,7 @@
           <a:p>
             <a:fld id="{1C371D64-64F3-4BCF-AF6C-AF00FD032500}" type="datetimeFigureOut">
               <a:rPr lang="pt-BR" smtClean="0"/>
-              <a:t>25/11/2020</a:t>
+              <a:t>27/11/2020</a:t>
             </a:fld>
             <a:endParaRPr lang="pt-BR"/>
           </a:p>
@@ -2185,7 +2568,7 @@
           <a:p>
             <a:fld id="{1C371D64-64F3-4BCF-AF6C-AF00FD032500}" type="datetimeFigureOut">
               <a:rPr lang="pt-BR" smtClean="0"/>
-              <a:t>25/11/2020</a:t>
+              <a:t>27/11/2020</a:t>
             </a:fld>
             <a:endParaRPr lang="pt-BR"/>
           </a:p>
@@ -2280,7 +2663,7 @@
           <a:p>
             <a:fld id="{1C371D64-64F3-4BCF-AF6C-AF00FD032500}" type="datetimeFigureOut">
               <a:rPr lang="pt-BR" smtClean="0"/>
-              <a:t>25/11/2020</a:t>
+              <a:t>27/11/2020</a:t>
             </a:fld>
             <a:endParaRPr lang="pt-BR"/>
           </a:p>
@@ -2557,7 +2940,7 @@
           <a:p>
             <a:fld id="{1C371D64-64F3-4BCF-AF6C-AF00FD032500}" type="datetimeFigureOut">
               <a:rPr lang="pt-BR" smtClean="0"/>
-              <a:t>25/11/2020</a:t>
+              <a:t>27/11/2020</a:t>
             </a:fld>
             <a:endParaRPr lang="pt-BR"/>
           </a:p>
@@ -2814,7 +3197,7 @@
           <a:p>
             <a:fld id="{1C371D64-64F3-4BCF-AF6C-AF00FD032500}" type="datetimeFigureOut">
               <a:rPr lang="pt-BR" smtClean="0"/>
-              <a:t>25/11/2020</a:t>
+              <a:t>27/11/2020</a:t>
             </a:fld>
             <a:endParaRPr lang="pt-BR"/>
           </a:p>
@@ -3027,7 +3410,7 @@
           <a:p>
             <a:fld id="{1C371D64-64F3-4BCF-AF6C-AF00FD032500}" type="datetimeFigureOut">
               <a:rPr lang="pt-BR" smtClean="0"/>
-              <a:t>25/11/2020</a:t>
+              <a:t>27/11/2020</a:t>
             </a:fld>
             <a:endParaRPr lang="pt-BR"/>
           </a:p>
@@ -4554,7 +4937,7 @@
         </p:nvSpPr>
         <p:spPr>
           <a:xfrm>
-            <a:off x="469783" y="780677"/>
+            <a:off x="469783" y="1451796"/>
             <a:ext cx="7046416" cy="307777"/>
           </a:xfrm>
           <a:prstGeom prst="rect">
@@ -4592,7 +4975,7 @@
         </p:nvSpPr>
         <p:spPr>
           <a:xfrm>
-            <a:off x="460290" y="1015110"/>
+            <a:off x="469783" y="2281847"/>
             <a:ext cx="6239209" cy="1015663"/>
           </a:xfrm>
           <a:prstGeom prst="rect">
@@ -4693,173 +5076,10 @@
           </a:p>
         </p:txBody>
       </p:sp>
-      <p:pic>
-        <p:nvPicPr>
-          <p:cNvPr id="4" name="Imagem 3">
-            <a:extLst>
-              <a:ext uri="{FF2B5EF4-FFF2-40B4-BE49-F238E27FC236}">
-                <a16:creationId xmlns:a16="http://schemas.microsoft.com/office/drawing/2014/main" id="{9FFB4A73-1E71-41CB-9FDB-A938FD46B90E}"/>
-              </a:ext>
-            </a:extLst>
-          </p:cNvPr>
-          <p:cNvPicPr>
-            <a:picLocks noChangeAspect="1"/>
-          </p:cNvPicPr>
-          <p:nvPr/>
-        </p:nvPicPr>
-        <p:blipFill>
-          <a:blip r:embed="rId4"/>
-          <a:stretch>
-            <a:fillRect/>
-          </a:stretch>
-        </p:blipFill>
-        <p:spPr>
-          <a:xfrm>
-            <a:off x="232572" y="2235155"/>
-            <a:ext cx="2259168" cy="2473195"/>
-          </a:xfrm>
-          <a:prstGeom prst="rect">
-            <a:avLst/>
-          </a:prstGeom>
-        </p:spPr>
-      </p:pic>
-      <p:pic>
-        <p:nvPicPr>
-          <p:cNvPr id="6" name="Imagem 5">
-            <a:extLst>
-              <a:ext uri="{FF2B5EF4-FFF2-40B4-BE49-F238E27FC236}">
-                <a16:creationId xmlns:a16="http://schemas.microsoft.com/office/drawing/2014/main" id="{8E8E180E-9949-4B05-9D33-ECB556BEDC17}"/>
-              </a:ext>
-            </a:extLst>
-          </p:cNvPr>
-          <p:cNvPicPr>
-            <a:picLocks noChangeAspect="1"/>
-          </p:cNvPicPr>
-          <p:nvPr/>
-        </p:nvPicPr>
-        <p:blipFill>
-          <a:blip r:embed="rId5"/>
-          <a:stretch>
-            <a:fillRect/>
-          </a:stretch>
-        </p:blipFill>
-        <p:spPr>
-          <a:xfrm>
-            <a:off x="2574639" y="2235154"/>
-            <a:ext cx="2189614" cy="2473195"/>
-          </a:xfrm>
-          <a:prstGeom prst="rect">
-            <a:avLst/>
-          </a:prstGeom>
-        </p:spPr>
-      </p:pic>
-      <p:pic>
-        <p:nvPicPr>
-          <p:cNvPr id="19" name="Imagem 18">
-            <a:extLst>
-              <a:ext uri="{FF2B5EF4-FFF2-40B4-BE49-F238E27FC236}">
-                <a16:creationId xmlns:a16="http://schemas.microsoft.com/office/drawing/2014/main" id="{34ADCC67-9E4A-4A8B-9C29-6FD4F0F7BEB3}"/>
-              </a:ext>
-            </a:extLst>
-          </p:cNvPr>
-          <p:cNvPicPr>
-            <a:picLocks noChangeAspect="1"/>
-          </p:cNvPicPr>
-          <p:nvPr/>
-        </p:nvPicPr>
-        <p:blipFill>
-          <a:blip r:embed="rId6"/>
-          <a:stretch>
-            <a:fillRect/>
-          </a:stretch>
-        </p:blipFill>
-        <p:spPr>
-          <a:xfrm>
-            <a:off x="4847152" y="2235155"/>
-            <a:ext cx="1980368" cy="2497165"/>
-          </a:xfrm>
-          <a:prstGeom prst="rect">
-            <a:avLst/>
-          </a:prstGeom>
-        </p:spPr>
-      </p:pic>
-      <p:pic>
-        <p:nvPicPr>
-          <p:cNvPr id="21" name="Imagem 20">
-            <a:extLst>
-              <a:ext uri="{FF2B5EF4-FFF2-40B4-BE49-F238E27FC236}">
-                <a16:creationId xmlns:a16="http://schemas.microsoft.com/office/drawing/2014/main" id="{81BE0C9B-F798-4834-B634-4CD0A4987D30}"/>
-              </a:ext>
-            </a:extLst>
-          </p:cNvPr>
-          <p:cNvPicPr>
-            <a:picLocks noChangeAspect="1"/>
-          </p:cNvPicPr>
-          <p:nvPr/>
-        </p:nvPicPr>
-        <p:blipFill>
-          <a:blip r:embed="rId7"/>
-          <a:stretch>
-            <a:fillRect/>
-          </a:stretch>
-        </p:blipFill>
-        <p:spPr>
-          <a:xfrm>
-            <a:off x="6910419" y="2235154"/>
-            <a:ext cx="1991884" cy="2497164"/>
-          </a:xfrm>
-          <a:prstGeom prst="rect">
-            <a:avLst/>
-          </a:prstGeom>
-        </p:spPr>
-      </p:pic>
-      <p:sp>
-        <p:nvSpPr>
-          <p:cNvPr id="32" name="CaixaDeTexto 31">
-            <a:extLst>
-              <a:ext uri="{FF2B5EF4-FFF2-40B4-BE49-F238E27FC236}">
-                <a16:creationId xmlns:a16="http://schemas.microsoft.com/office/drawing/2014/main" id="{77018659-2399-4193-B0CF-FC08F3E123BF}"/>
-              </a:ext>
-            </a:extLst>
-          </p:cNvPr>
-          <p:cNvSpPr txBox="1"/>
-          <p:nvPr/>
-        </p:nvSpPr>
-        <p:spPr>
-          <a:xfrm>
-            <a:off x="232572" y="4820466"/>
-            <a:ext cx="2575833" cy="307777"/>
-          </a:xfrm>
-          <a:prstGeom prst="rect">
-            <a:avLst/>
-          </a:prstGeom>
-          <a:noFill/>
-        </p:spPr>
-        <p:txBody>
-          <a:bodyPr wrap="none" rtlCol="0">
-            <a:spAutoFit/>
-          </a:bodyPr>
-          <a:lstStyle/>
-          <a:p>
-            <a:r>
-              <a:rPr lang="pt-BR" sz="1400" b="1" dirty="0">
-                <a:solidFill>
-                  <a:schemeClr val="accent6">
-                    <a:lumMod val="50000"/>
-                  </a:schemeClr>
-                </a:solidFill>
-                <a:latin typeface="Arial" panose="020B0604020202020204" pitchFamily="34" charset="0"/>
-                <a:cs typeface="Arial" panose="020B0604020202020204" pitchFamily="34" charset="0"/>
-              </a:rPr>
-              <a:t>Telas de acesso ao sistema</a:t>
-            </a:r>
-          </a:p>
-        </p:txBody>
-      </p:sp>
     </p:spTree>
     <p:extLst>
       <p:ext uri="{BB962C8B-B14F-4D97-AF65-F5344CB8AC3E}">
-        <p14:creationId xmlns:p14="http://schemas.microsoft.com/office/powerpoint/2010/main" val="1055203194"/>
+        <p14:creationId xmlns:p14="http://schemas.microsoft.com/office/powerpoint/2010/main" val="1778661698"/>
       </p:ext>
     </p:extLst>
   </p:cSld>
@@ -5115,10 +5335,10 @@
       </p:grpSp>
       <p:sp>
         <p:nvSpPr>
-          <p:cNvPr id="2" name="CaixaDeTexto 1">
+          <p:cNvPr id="13" name="CaixaDeTexto 12">
             <a:extLst>
               <a:ext uri="{FF2B5EF4-FFF2-40B4-BE49-F238E27FC236}">
-                <a16:creationId xmlns:a16="http://schemas.microsoft.com/office/drawing/2014/main" id="{9D038FE3-9B74-4232-B802-7857509E6E8E}"/>
+                <a16:creationId xmlns:a16="http://schemas.microsoft.com/office/drawing/2014/main" id="{F4FB8751-C068-4690-A1CE-8DD24E400495}"/>
               </a:ext>
             </a:extLst>
           </p:cNvPr>
@@ -5127,8 +5347,8 @@
         </p:nvSpPr>
         <p:spPr>
           <a:xfrm>
-            <a:off x="469783" y="780677"/>
-            <a:ext cx="7046416" cy="307777"/>
+            <a:off x="219235" y="1149782"/>
+            <a:ext cx="6239209" cy="646331"/>
           </a:xfrm>
           <a:prstGeom prst="rect">
             <a:avLst/>
@@ -5141,16 +5361,936 @@
           </a:bodyPr>
           <a:lstStyle/>
           <a:p>
-            <a:r>
-              <a:rPr lang="pt-BR" sz="1400" dirty="0">
+            <a:pPr marL="342900" indent="-342900">
+              <a:buFont typeface="+mj-lt"/>
+              <a:buAutoNum type="arabicPeriod"/>
+            </a:pPr>
+            <a:r>
+              <a:rPr lang="pt-BR" sz="1200" dirty="0" err="1">
                 <a:latin typeface="Arial" panose="020B0604020202020204" pitchFamily="34" charset="0"/>
                 <a:cs typeface="Arial" panose="020B0604020202020204" pitchFamily="34" charset="0"/>
               </a:rPr>
-              <a:t>O SGEP, é um sistema de ponto e escalas e o processo esperado nesse documento é:</a:t>
+              <a:t>Logar</a:t>
+            </a:r>
+            <a:r>
+              <a:rPr lang="pt-BR" sz="1200" dirty="0">
+                <a:latin typeface="Arial" panose="020B0604020202020204" pitchFamily="34" charset="0"/>
+                <a:cs typeface="Arial" panose="020B0604020202020204" pitchFamily="34" charset="0"/>
+              </a:rPr>
+              <a:t> no sistema, usando um </a:t>
+            </a:r>
+            <a:r>
+              <a:rPr lang="pt-BR" sz="1200" dirty="0" err="1">
+                <a:latin typeface="Arial" panose="020B0604020202020204" pitchFamily="34" charset="0"/>
+                <a:cs typeface="Arial" panose="020B0604020202020204" pitchFamily="34" charset="0"/>
+              </a:rPr>
+              <a:t>email</a:t>
+            </a:r>
+            <a:r>
+              <a:rPr lang="pt-BR" sz="1200" dirty="0">
+                <a:latin typeface="Arial" panose="020B0604020202020204" pitchFamily="34" charset="0"/>
+                <a:cs typeface="Arial" panose="020B0604020202020204" pitchFamily="34" charset="0"/>
+              </a:rPr>
+              <a:t> e senha;</a:t>
+            </a:r>
+          </a:p>
+          <a:p>
+            <a:pPr marL="342900" indent="-342900">
+              <a:buFont typeface="+mj-lt"/>
+              <a:buAutoNum type="arabicPeriod"/>
+            </a:pPr>
+            <a:r>
+              <a:rPr lang="pt-BR" sz="1200" dirty="0">
+                <a:latin typeface="Arial" panose="020B0604020202020204" pitchFamily="34" charset="0"/>
+                <a:cs typeface="Arial" panose="020B0604020202020204" pitchFamily="34" charset="0"/>
+              </a:rPr>
+              <a:t>O sistema verifica as credencias passadas, permitindo ou não o acesso ao sistema.</a:t>
+            </a:r>
+          </a:p>
+          <a:p>
+            <a:pPr marL="342900" indent="-342900">
+              <a:buFont typeface="+mj-lt"/>
+              <a:buAutoNum type="arabicPeriod"/>
+            </a:pPr>
+            <a:r>
+              <a:rPr lang="pt-BR" sz="1200" dirty="0">
+                <a:latin typeface="Arial" panose="020B0604020202020204" pitchFamily="34" charset="0"/>
+                <a:cs typeface="Arial" panose="020B0604020202020204" pitchFamily="34" charset="0"/>
+              </a:rPr>
+              <a:t>Finaliza o acesso clicando em Sair.</a:t>
             </a:r>
           </a:p>
         </p:txBody>
       </p:sp>
+      <p:pic>
+        <p:nvPicPr>
+          <p:cNvPr id="4" name="Imagem 3">
+            <a:extLst>
+              <a:ext uri="{FF2B5EF4-FFF2-40B4-BE49-F238E27FC236}">
+                <a16:creationId xmlns:a16="http://schemas.microsoft.com/office/drawing/2014/main" id="{9FFB4A73-1E71-41CB-9FDB-A938FD46B90E}"/>
+              </a:ext>
+            </a:extLst>
+          </p:cNvPr>
+          <p:cNvPicPr>
+            <a:picLocks noChangeAspect="1"/>
+          </p:cNvPicPr>
+          <p:nvPr/>
+        </p:nvPicPr>
+        <p:blipFill>
+          <a:blip r:embed="rId4"/>
+          <a:stretch>
+            <a:fillRect/>
+          </a:stretch>
+        </p:blipFill>
+        <p:spPr>
+          <a:xfrm>
+            <a:off x="219235" y="4164623"/>
+            <a:ext cx="2259168" cy="2473195"/>
+          </a:xfrm>
+          <a:prstGeom prst="rect">
+            <a:avLst/>
+          </a:prstGeom>
+        </p:spPr>
+      </p:pic>
+      <p:pic>
+        <p:nvPicPr>
+          <p:cNvPr id="6" name="Imagem 5">
+            <a:extLst>
+              <a:ext uri="{FF2B5EF4-FFF2-40B4-BE49-F238E27FC236}">
+                <a16:creationId xmlns:a16="http://schemas.microsoft.com/office/drawing/2014/main" id="{8E8E180E-9949-4B05-9D33-ECB556BEDC17}"/>
+              </a:ext>
+            </a:extLst>
+          </p:cNvPr>
+          <p:cNvPicPr>
+            <a:picLocks noChangeAspect="1"/>
+          </p:cNvPicPr>
+          <p:nvPr/>
+        </p:nvPicPr>
+        <p:blipFill>
+          <a:blip r:embed="rId5"/>
+          <a:stretch>
+            <a:fillRect/>
+          </a:stretch>
+        </p:blipFill>
+        <p:spPr>
+          <a:xfrm>
+            <a:off x="2765720" y="4145570"/>
+            <a:ext cx="2189614" cy="2473195"/>
+          </a:xfrm>
+          <a:prstGeom prst="rect">
+            <a:avLst/>
+          </a:prstGeom>
+        </p:spPr>
+      </p:pic>
+      <p:sp>
+        <p:nvSpPr>
+          <p:cNvPr id="14" name="CaixaDeTexto 13">
+            <a:extLst>
+              <a:ext uri="{FF2B5EF4-FFF2-40B4-BE49-F238E27FC236}">
+                <a16:creationId xmlns:a16="http://schemas.microsoft.com/office/drawing/2014/main" id="{40F6D25C-69B1-46FF-9AFF-E45927201F26}"/>
+              </a:ext>
+            </a:extLst>
+          </p:cNvPr>
+          <p:cNvSpPr txBox="1"/>
+          <p:nvPr/>
+        </p:nvSpPr>
+        <p:spPr>
+          <a:xfrm>
+            <a:off x="219235" y="855563"/>
+            <a:ext cx="2489784" cy="307777"/>
+          </a:xfrm>
+          <a:prstGeom prst="rect">
+            <a:avLst/>
+          </a:prstGeom>
+          <a:noFill/>
+        </p:spPr>
+        <p:txBody>
+          <a:bodyPr wrap="none" rtlCol="0">
+            <a:spAutoFit/>
+          </a:bodyPr>
+          <a:lstStyle/>
+          <a:p>
+            <a:r>
+              <a:rPr lang="pt-BR" sz="1400" b="1" dirty="0">
+                <a:solidFill>
+                  <a:schemeClr val="accent6">
+                    <a:lumMod val="50000"/>
+                  </a:schemeClr>
+                </a:solidFill>
+                <a:latin typeface="Arial" panose="020B0604020202020204" pitchFamily="34" charset="0"/>
+                <a:cs typeface="Arial" panose="020B0604020202020204" pitchFamily="34" charset="0"/>
+              </a:rPr>
+              <a:t>TC01 – Login com sucesso</a:t>
+            </a:r>
+          </a:p>
+        </p:txBody>
+      </p:sp>
+      <p:graphicFrame>
+        <p:nvGraphicFramePr>
+          <p:cNvPr id="3" name="Tabela 4">
+            <a:extLst>
+              <a:ext uri="{FF2B5EF4-FFF2-40B4-BE49-F238E27FC236}">
+                <a16:creationId xmlns:a16="http://schemas.microsoft.com/office/drawing/2014/main" id="{EAF21583-3D57-49DB-B499-7D3A84340E56}"/>
+              </a:ext>
+            </a:extLst>
+          </p:cNvPr>
+          <p:cNvGraphicFramePr>
+            <a:graphicFrameLocks noGrp="1"/>
+          </p:cNvGraphicFramePr>
+          <p:nvPr>
+            <p:extLst>
+              <p:ext uri="{D42A27DB-BD31-4B8C-83A1-F6EECF244321}">
+                <p14:modId xmlns:p14="http://schemas.microsoft.com/office/powerpoint/2010/main" val="639722390"/>
+              </p:ext>
+            </p:extLst>
+          </p:nvPr>
+        </p:nvGraphicFramePr>
+        <p:xfrm>
+          <a:off x="219234" y="1942285"/>
+          <a:ext cx="8094255" cy="1463412"/>
+        </p:xfrm>
+        <a:graphic>
+          <a:graphicData uri="http://schemas.openxmlformats.org/drawingml/2006/table">
+            <a:tbl>
+              <a:tblPr firstRow="1" bandRow="1">
+                <a:tableStyleId>{93296810-A885-4BE3-A3E7-6D5BEEA58F35}</a:tableStyleId>
+              </a:tblPr>
+              <a:tblGrid>
+                <a:gridCol w="422990">
+                  <a:extLst>
+                    <a:ext uri="{9D8B030D-6E8A-4147-A177-3AD203B41FA5}">
+                      <a16:colId xmlns:a16="http://schemas.microsoft.com/office/drawing/2014/main" val="1736460137"/>
+                    </a:ext>
+                  </a:extLst>
+                </a:gridCol>
+                <a:gridCol w="2562370">
+                  <a:extLst>
+                    <a:ext uri="{9D8B030D-6E8A-4147-A177-3AD203B41FA5}">
+                      <a16:colId xmlns:a16="http://schemas.microsoft.com/office/drawing/2014/main" val="549836352"/>
+                    </a:ext>
+                  </a:extLst>
+                </a:gridCol>
+                <a:gridCol w="3085331">
+                  <a:extLst>
+                    <a:ext uri="{9D8B030D-6E8A-4147-A177-3AD203B41FA5}">
+                      <a16:colId xmlns:a16="http://schemas.microsoft.com/office/drawing/2014/main" val="1077555547"/>
+                    </a:ext>
+                  </a:extLst>
+                </a:gridCol>
+                <a:gridCol w="2023564">
+                  <a:extLst>
+                    <a:ext uri="{9D8B030D-6E8A-4147-A177-3AD203B41FA5}">
+                      <a16:colId xmlns:a16="http://schemas.microsoft.com/office/drawing/2014/main" val="3071683254"/>
+                    </a:ext>
+                  </a:extLst>
+                </a:gridCol>
+              </a:tblGrid>
+              <a:tr h="259173">
+                <a:tc>
+                  <a:txBody>
+                    <a:bodyPr/>
+                    <a:lstStyle/>
+                    <a:p>
+                      <a:r>
+                        <a:rPr lang="pt-BR" sz="1100" dirty="0">
+                          <a:latin typeface="Courier New" panose="02070309020205020404" pitchFamily="49" charset="0"/>
+                          <a:cs typeface="Courier New" panose="02070309020205020404" pitchFamily="49" charset="0"/>
+                        </a:rPr>
+                        <a:t>#</a:t>
+                      </a:r>
+                    </a:p>
+                  </a:txBody>
+                  <a:tcPr/>
+                </a:tc>
+                <a:tc>
+                  <a:txBody>
+                    <a:bodyPr/>
+                    <a:lstStyle/>
+                    <a:p>
+                      <a:r>
+                        <a:rPr lang="pt-BR" sz="1100" dirty="0">
+                          <a:latin typeface="Courier New" panose="02070309020205020404" pitchFamily="49" charset="0"/>
+                          <a:cs typeface="Courier New" panose="02070309020205020404" pitchFamily="49" charset="0"/>
+                        </a:rPr>
+                        <a:t>AÇÃO</a:t>
+                      </a:r>
+                    </a:p>
+                  </a:txBody>
+                  <a:tcPr/>
+                </a:tc>
+                <a:tc>
+                  <a:txBody>
+                    <a:bodyPr/>
+                    <a:lstStyle/>
+                    <a:p>
+                      <a:r>
+                        <a:rPr lang="pt-BR" sz="1100" dirty="0">
+                          <a:latin typeface="Courier New" panose="02070309020205020404" pitchFamily="49" charset="0"/>
+                          <a:cs typeface="Courier New" panose="02070309020205020404" pitchFamily="49" charset="0"/>
+                        </a:rPr>
+                        <a:t>VALOR DE ENTRADA</a:t>
+                      </a:r>
+                    </a:p>
+                  </a:txBody>
+                  <a:tcPr/>
+                </a:tc>
+                <a:tc>
+                  <a:txBody>
+                    <a:bodyPr/>
+                    <a:lstStyle/>
+                    <a:p>
+                      <a:r>
+                        <a:rPr lang="pt-BR" sz="1100" dirty="0">
+                          <a:latin typeface="Courier New" panose="02070309020205020404" pitchFamily="49" charset="0"/>
+                          <a:cs typeface="Courier New" panose="02070309020205020404" pitchFamily="49" charset="0"/>
+                        </a:rPr>
+                        <a:t>RESULTADO ESPERADO</a:t>
+                      </a:r>
+                    </a:p>
+                  </a:txBody>
+                  <a:tcPr/>
+                </a:tc>
+                <a:extLst>
+                  <a:ext uri="{0D108BD9-81ED-4DB2-BD59-A6C34878D82A}">
+                    <a16:rowId xmlns:a16="http://schemas.microsoft.com/office/drawing/2014/main" val="2518228030"/>
+                  </a:ext>
+                </a:extLst>
+              </a:tr>
+              <a:tr h="259173">
+                <a:tc>
+                  <a:txBody>
+                    <a:bodyPr/>
+                    <a:lstStyle/>
+                    <a:p>
+                      <a:r>
+                        <a:rPr lang="pt-BR" sz="1100" b="1" dirty="0">
+                          <a:latin typeface="Courier New" panose="02070309020205020404" pitchFamily="49" charset="0"/>
+                          <a:cs typeface="Courier New" panose="02070309020205020404" pitchFamily="49" charset="0"/>
+                        </a:rPr>
+                        <a:t>1</a:t>
+                      </a:r>
+                    </a:p>
+                  </a:txBody>
+                  <a:tcPr/>
+                </a:tc>
+                <a:tc>
+                  <a:txBody>
+                    <a:bodyPr/>
+                    <a:lstStyle/>
+                    <a:p>
+                      <a:r>
+                        <a:rPr lang="pt-BR" sz="1100" dirty="0">
+                          <a:latin typeface="Courier New" panose="02070309020205020404" pitchFamily="49" charset="0"/>
+                          <a:cs typeface="Courier New" panose="02070309020205020404" pitchFamily="49" charset="0"/>
+                        </a:rPr>
+                        <a:t>Digitar </a:t>
+                      </a:r>
+                      <a:r>
+                        <a:rPr lang="pt-BR" sz="1100" dirty="0" err="1">
+                          <a:latin typeface="Courier New" panose="02070309020205020404" pitchFamily="49" charset="0"/>
+                          <a:cs typeface="Courier New" panose="02070309020205020404" pitchFamily="49" charset="0"/>
+                        </a:rPr>
+                        <a:t>email</a:t>
+                      </a:r>
+                      <a:r>
+                        <a:rPr lang="pt-BR" sz="1100" dirty="0">
+                          <a:latin typeface="Courier New" panose="02070309020205020404" pitchFamily="49" charset="0"/>
+                          <a:cs typeface="Courier New" panose="02070309020205020404" pitchFamily="49" charset="0"/>
+                        </a:rPr>
+                        <a:t> no campo Usuário</a:t>
+                      </a:r>
+                    </a:p>
+                  </a:txBody>
+                  <a:tcPr/>
+                </a:tc>
+                <a:tc>
+                  <a:txBody>
+                    <a:bodyPr/>
+                    <a:lstStyle/>
+                    <a:p>
+                      <a:r>
+                        <a:rPr lang="pt-BR" sz="1100" dirty="0">
+                          <a:latin typeface="Courier New" panose="02070309020205020404" pitchFamily="49" charset="0"/>
+                          <a:cs typeface="Courier New" panose="02070309020205020404" pitchFamily="49" charset="0"/>
+                        </a:rPr>
+                        <a:t>ipsum.primis@velvulputateeu.edu</a:t>
+                      </a:r>
+                    </a:p>
+                  </a:txBody>
+                  <a:tcPr/>
+                </a:tc>
+                <a:tc>
+                  <a:txBody>
+                    <a:bodyPr/>
+                    <a:lstStyle/>
+                    <a:p>
+                      <a:endParaRPr lang="pt-BR" sz="1100">
+                        <a:latin typeface="Courier New" panose="02070309020205020404" pitchFamily="49" charset="0"/>
+                        <a:cs typeface="Courier New" panose="02070309020205020404" pitchFamily="49" charset="0"/>
+                      </a:endParaRPr>
+                    </a:p>
+                  </a:txBody>
+                  <a:tcPr/>
+                </a:tc>
+                <a:extLst>
+                  <a:ext uri="{0D108BD9-81ED-4DB2-BD59-A6C34878D82A}">
+                    <a16:rowId xmlns:a16="http://schemas.microsoft.com/office/drawing/2014/main" val="1558016765"/>
+                  </a:ext>
+                </a:extLst>
+              </a:tr>
+              <a:tr h="259173">
+                <a:tc>
+                  <a:txBody>
+                    <a:bodyPr/>
+                    <a:lstStyle/>
+                    <a:p>
+                      <a:r>
+                        <a:rPr lang="pt-BR" sz="1100" b="1" dirty="0">
+                          <a:latin typeface="Courier New" panose="02070309020205020404" pitchFamily="49" charset="0"/>
+                          <a:cs typeface="Courier New" panose="02070309020205020404" pitchFamily="49" charset="0"/>
+                        </a:rPr>
+                        <a:t>2</a:t>
+                      </a:r>
+                    </a:p>
+                  </a:txBody>
+                  <a:tcPr/>
+                </a:tc>
+                <a:tc>
+                  <a:txBody>
+                    <a:bodyPr/>
+                    <a:lstStyle/>
+                    <a:p>
+                      <a:r>
+                        <a:rPr lang="pt-BR" sz="1100" dirty="0">
+                          <a:latin typeface="Courier New" panose="02070309020205020404" pitchFamily="49" charset="0"/>
+                          <a:cs typeface="Courier New" panose="02070309020205020404" pitchFamily="49" charset="0"/>
+                        </a:rPr>
+                        <a:t>Digitar a senha</a:t>
+                      </a:r>
+                    </a:p>
+                  </a:txBody>
+                  <a:tcPr/>
+                </a:tc>
+                <a:tc>
+                  <a:txBody>
+                    <a:bodyPr/>
+                    <a:lstStyle/>
+                    <a:p>
+                      <a:r>
+                        <a:rPr lang="pt-BR" sz="1100" dirty="0">
+                          <a:latin typeface="Courier New" panose="02070309020205020404" pitchFamily="49" charset="0"/>
+                          <a:cs typeface="Courier New" panose="02070309020205020404" pitchFamily="49" charset="0"/>
+                        </a:rPr>
+                        <a:t>SRA27GAX6TA</a:t>
+                      </a:r>
+                    </a:p>
+                  </a:txBody>
+                  <a:tcPr/>
+                </a:tc>
+                <a:tc>
+                  <a:txBody>
+                    <a:bodyPr/>
+                    <a:lstStyle/>
+                    <a:p>
+                      <a:endParaRPr lang="pt-BR" sz="1100">
+                        <a:latin typeface="Courier New" panose="02070309020205020404" pitchFamily="49" charset="0"/>
+                        <a:cs typeface="Courier New" panose="02070309020205020404" pitchFamily="49" charset="0"/>
+                      </a:endParaRPr>
+                    </a:p>
+                  </a:txBody>
+                  <a:tcPr/>
+                </a:tc>
+                <a:extLst>
+                  <a:ext uri="{0D108BD9-81ED-4DB2-BD59-A6C34878D82A}">
+                    <a16:rowId xmlns:a16="http://schemas.microsoft.com/office/drawing/2014/main" val="362632068"/>
+                  </a:ext>
+                </a:extLst>
+              </a:tr>
+              <a:tr h="259173">
+                <a:tc>
+                  <a:txBody>
+                    <a:bodyPr/>
+                    <a:lstStyle/>
+                    <a:p>
+                      <a:r>
+                        <a:rPr lang="pt-BR" sz="1100" b="1" dirty="0">
+                          <a:latin typeface="Courier New" panose="02070309020205020404" pitchFamily="49" charset="0"/>
+                          <a:cs typeface="Courier New" panose="02070309020205020404" pitchFamily="49" charset="0"/>
+                        </a:rPr>
+                        <a:t>3</a:t>
+                      </a:r>
+                    </a:p>
+                  </a:txBody>
+                  <a:tcPr/>
+                </a:tc>
+                <a:tc>
+                  <a:txBody>
+                    <a:bodyPr/>
+                    <a:lstStyle/>
+                    <a:p>
+                      <a:r>
+                        <a:rPr lang="pt-BR" sz="1100" dirty="0">
+                          <a:latin typeface="Courier New" panose="02070309020205020404" pitchFamily="49" charset="0"/>
+                          <a:cs typeface="Courier New" panose="02070309020205020404" pitchFamily="49" charset="0"/>
+                        </a:rPr>
+                        <a:t>Clicar em entrar</a:t>
+                      </a:r>
+                    </a:p>
+                  </a:txBody>
+                  <a:tcPr/>
+                </a:tc>
+                <a:tc>
+                  <a:txBody>
+                    <a:bodyPr/>
+                    <a:lstStyle/>
+                    <a:p>
+                      <a:r>
+                        <a:rPr lang="pt-BR" sz="1100" dirty="0">
+                          <a:latin typeface="Courier New" panose="02070309020205020404" pitchFamily="49" charset="0"/>
+                          <a:cs typeface="Courier New" panose="02070309020205020404" pitchFamily="49" charset="0"/>
+                        </a:rPr>
+                        <a:t>N/A</a:t>
+                      </a:r>
+                    </a:p>
+                  </a:txBody>
+                  <a:tcPr/>
+                </a:tc>
+                <a:tc>
+                  <a:txBody>
+                    <a:bodyPr/>
+                    <a:lstStyle/>
+                    <a:p>
+                      <a:r>
+                        <a:rPr lang="pt-BR" sz="1100" dirty="0">
+                          <a:latin typeface="Courier New" panose="02070309020205020404" pitchFamily="49" charset="0"/>
+                          <a:cs typeface="Courier New" panose="02070309020205020404" pitchFamily="49" charset="0"/>
+                        </a:rPr>
+                        <a:t>Acesso ao sistema</a:t>
+                      </a:r>
+                    </a:p>
+                  </a:txBody>
+                  <a:tcPr/>
+                </a:tc>
+                <a:extLst>
+                  <a:ext uri="{0D108BD9-81ED-4DB2-BD59-A6C34878D82A}">
+                    <a16:rowId xmlns:a16="http://schemas.microsoft.com/office/drawing/2014/main" val="3299120065"/>
+                  </a:ext>
+                </a:extLst>
+              </a:tr>
+              <a:tr h="259173">
+                <a:tc>
+                  <a:txBody>
+                    <a:bodyPr/>
+                    <a:lstStyle/>
+                    <a:p>
+                      <a:r>
+                        <a:rPr lang="pt-BR" sz="1100" b="1" dirty="0">
+                          <a:latin typeface="Courier New" panose="02070309020205020404" pitchFamily="49" charset="0"/>
+                          <a:cs typeface="Courier New" panose="02070309020205020404" pitchFamily="49" charset="0"/>
+                        </a:rPr>
+                        <a:t>4</a:t>
+                      </a:r>
+                    </a:p>
+                  </a:txBody>
+                  <a:tcPr/>
+                </a:tc>
+                <a:tc>
+                  <a:txBody>
+                    <a:bodyPr/>
+                    <a:lstStyle/>
+                    <a:p>
+                      <a:r>
+                        <a:rPr lang="pt-BR" sz="1100" dirty="0">
+                          <a:latin typeface="Courier New" panose="02070309020205020404" pitchFamily="49" charset="0"/>
+                          <a:cs typeface="Courier New" panose="02070309020205020404" pitchFamily="49" charset="0"/>
+                        </a:rPr>
+                        <a:t>Clicar em sair</a:t>
+                      </a:r>
+                    </a:p>
+                  </a:txBody>
+                  <a:tcPr/>
+                </a:tc>
+                <a:tc>
+                  <a:txBody>
+                    <a:bodyPr/>
+                    <a:lstStyle/>
+                    <a:p>
+                      <a:r>
+                        <a:rPr lang="pt-BR" sz="1100" dirty="0">
+                          <a:latin typeface="Courier New" panose="02070309020205020404" pitchFamily="49" charset="0"/>
+                          <a:cs typeface="Courier New" panose="02070309020205020404" pitchFamily="49" charset="0"/>
+                        </a:rPr>
+                        <a:t>N/A</a:t>
+                      </a:r>
+                    </a:p>
+                  </a:txBody>
+                  <a:tcPr/>
+                </a:tc>
+                <a:tc>
+                  <a:txBody>
+                    <a:bodyPr/>
+                    <a:lstStyle/>
+                    <a:p>
+                      <a:r>
+                        <a:rPr lang="pt-BR" sz="1100" dirty="0">
+                          <a:latin typeface="Courier New" panose="02070309020205020404" pitchFamily="49" charset="0"/>
+                          <a:cs typeface="Courier New" panose="02070309020205020404" pitchFamily="49" charset="0"/>
+                        </a:rPr>
+                        <a:t>Logout do sistema</a:t>
+                      </a:r>
+                    </a:p>
+                  </a:txBody>
+                  <a:tcPr/>
+                </a:tc>
+                <a:extLst>
+                  <a:ext uri="{0D108BD9-81ED-4DB2-BD59-A6C34878D82A}">
+                    <a16:rowId xmlns:a16="http://schemas.microsoft.com/office/drawing/2014/main" val="602460712"/>
+                  </a:ext>
+                </a:extLst>
+              </a:tr>
+            </a:tbl>
+          </a:graphicData>
+        </a:graphic>
+      </p:graphicFrame>
+      <p:pic>
+        <p:nvPicPr>
+          <p:cNvPr id="16" name="Imagem 15">
+            <a:extLst>
+              <a:ext uri="{FF2B5EF4-FFF2-40B4-BE49-F238E27FC236}">
+                <a16:creationId xmlns:a16="http://schemas.microsoft.com/office/drawing/2014/main" id="{4433C870-3005-4EAF-8959-D96A0D0AE9A2}"/>
+              </a:ext>
+            </a:extLst>
+          </p:cNvPr>
+          <p:cNvPicPr>
+            <a:picLocks noChangeAspect="1"/>
+          </p:cNvPicPr>
+          <p:nvPr/>
+        </p:nvPicPr>
+        <p:blipFill>
+          <a:blip r:embed="rId6"/>
+          <a:stretch>
+            <a:fillRect/>
+          </a:stretch>
+        </p:blipFill>
+        <p:spPr>
+          <a:xfrm>
+            <a:off x="5283474" y="4145570"/>
+            <a:ext cx="1758153" cy="2492247"/>
+          </a:xfrm>
+          <a:prstGeom prst="rect">
+            <a:avLst/>
+          </a:prstGeom>
+        </p:spPr>
+      </p:pic>
+      <p:sp>
+        <p:nvSpPr>
+          <p:cNvPr id="17" name="CaixaDeTexto 16">
+            <a:extLst>
+              <a:ext uri="{FF2B5EF4-FFF2-40B4-BE49-F238E27FC236}">
+                <a16:creationId xmlns:a16="http://schemas.microsoft.com/office/drawing/2014/main" id="{583E71A0-B03D-4BFA-8639-592C59F4CF52}"/>
+              </a:ext>
+            </a:extLst>
+          </p:cNvPr>
+          <p:cNvSpPr txBox="1"/>
+          <p:nvPr/>
+        </p:nvSpPr>
+        <p:spPr>
+          <a:xfrm>
+            <a:off x="219234" y="3551869"/>
+            <a:ext cx="4442242" cy="276999"/>
+          </a:xfrm>
+          <a:prstGeom prst="rect">
+            <a:avLst/>
+          </a:prstGeom>
+          <a:noFill/>
+        </p:spPr>
+        <p:txBody>
+          <a:bodyPr wrap="none" rtlCol="0">
+            <a:spAutoFit/>
+          </a:bodyPr>
+          <a:lstStyle/>
+          <a:p>
+            <a:r>
+              <a:rPr lang="pt-BR" sz="1200" dirty="0">
+                <a:latin typeface="Arial" panose="020B0604020202020204" pitchFamily="34" charset="0"/>
+                <a:cs typeface="Arial" panose="020B0604020202020204" pitchFamily="34" charset="0"/>
+              </a:rPr>
+              <a:t>Nesse teste vamos validar as </a:t>
+            </a:r>
+            <a:r>
+              <a:rPr lang="pt-BR" sz="1200" dirty="0" err="1">
+                <a:latin typeface="Arial" panose="020B0604020202020204" pitchFamily="34" charset="0"/>
+                <a:cs typeface="Arial" panose="020B0604020202020204" pitchFamily="34" charset="0"/>
+              </a:rPr>
+              <a:t>as</a:t>
+            </a:r>
+            <a:r>
+              <a:rPr lang="pt-BR" sz="1200" dirty="0">
+                <a:latin typeface="Arial" panose="020B0604020202020204" pitchFamily="34" charset="0"/>
+                <a:cs typeface="Arial" panose="020B0604020202020204" pitchFamily="34" charset="0"/>
+              </a:rPr>
+              <a:t> rotinas de consulta ao banco.</a:t>
+            </a:r>
+          </a:p>
+        </p:txBody>
+      </p:sp>
+    </p:spTree>
+    <p:extLst>
+      <p:ext uri="{BB962C8B-B14F-4D97-AF65-F5344CB8AC3E}">
+        <p14:creationId xmlns:p14="http://schemas.microsoft.com/office/powerpoint/2010/main" val="1055203194"/>
+      </p:ext>
+    </p:extLst>
+  </p:cSld>
+  <p:clrMapOvr>
+    <a:masterClrMapping/>
+  </p:clrMapOvr>
+</p:sld>
+</file>
+
+<file path=ppt/slides/slide5.xml><?xml version="1.0" encoding="utf-8"?>
+<p:sld xmlns:a="http://schemas.openxmlformats.org/drawingml/2006/main" xmlns:r="http://schemas.openxmlformats.org/officeDocument/2006/relationships" xmlns:p="http://schemas.openxmlformats.org/presentationml/2006/main">
+  <p:cSld>
+    <p:spTree>
+      <p:nvGrpSpPr>
+        <p:cNvPr id="1" name=""/>
+        <p:cNvGrpSpPr/>
+        <p:nvPr/>
+      </p:nvGrpSpPr>
+      <p:grpSpPr>
+        <a:xfrm>
+          <a:off x="0" y="0"/>
+          <a:ext cx="0" cy="0"/>
+          <a:chOff x="0" y="0"/>
+          <a:chExt cx="0" cy="0"/>
+        </a:xfrm>
+      </p:grpSpPr>
+      <p:grpSp>
+        <p:nvGrpSpPr>
+          <p:cNvPr id="11" name="Agrupar 10">
+            <a:extLst>
+              <a:ext uri="{FF2B5EF4-FFF2-40B4-BE49-F238E27FC236}">
+                <a16:creationId xmlns:a16="http://schemas.microsoft.com/office/drawing/2014/main" id="{A31A092D-861A-4222-987B-6C885E397CEA}"/>
+              </a:ext>
+            </a:extLst>
+          </p:cNvPr>
+          <p:cNvGrpSpPr/>
+          <p:nvPr/>
+        </p:nvGrpSpPr>
+        <p:grpSpPr>
+          <a:xfrm>
+            <a:off x="342358" y="42006"/>
+            <a:ext cx="8459283" cy="731036"/>
+            <a:chOff x="342358" y="42006"/>
+            <a:chExt cx="8459283" cy="731036"/>
+          </a:xfrm>
+        </p:grpSpPr>
+        <p:pic>
+          <p:nvPicPr>
+            <p:cNvPr id="7" name="Imagem 6">
+              <a:extLst>
+                <a:ext uri="{FF2B5EF4-FFF2-40B4-BE49-F238E27FC236}">
+                  <a16:creationId xmlns:a16="http://schemas.microsoft.com/office/drawing/2014/main" id="{81677A8A-DA4A-4C9A-90F9-A1A87F33632C}"/>
+                </a:ext>
+              </a:extLst>
+            </p:cNvPr>
+            <p:cNvPicPr>
+              <a:picLocks noChangeAspect="1"/>
+            </p:cNvPicPr>
+            <p:nvPr/>
+          </p:nvPicPr>
+          <p:blipFill>
+            <a:blip r:embed="rId2" r:link="rId3">
+              <a:extLst>
+                <a:ext uri="{28A0092B-C50C-407E-A947-70E740481C1C}">
+                  <a14:useLocalDpi xmlns:a14="http://schemas.microsoft.com/office/drawing/2010/main" val="0"/>
+                </a:ext>
+              </a:extLst>
+            </a:blip>
+            <a:stretch>
+              <a:fillRect/>
+            </a:stretch>
+          </p:blipFill>
+          <p:spPr>
+            <a:xfrm>
+              <a:off x="342358" y="42006"/>
+              <a:ext cx="974714" cy="731036"/>
+            </a:xfrm>
+            <a:prstGeom prst="rect">
+              <a:avLst/>
+            </a:prstGeom>
+          </p:spPr>
+        </p:pic>
+        <p:sp>
+          <p:nvSpPr>
+            <p:cNvPr id="8" name="CaixaDeTexto 7">
+              <a:extLst>
+                <a:ext uri="{FF2B5EF4-FFF2-40B4-BE49-F238E27FC236}">
+                  <a16:creationId xmlns:a16="http://schemas.microsoft.com/office/drawing/2014/main" id="{96E3142D-CAD8-424E-A180-28D52A1B91C6}"/>
+                </a:ext>
+              </a:extLst>
+            </p:cNvPr>
+            <p:cNvSpPr txBox="1"/>
+            <p:nvPr/>
+          </p:nvSpPr>
+          <p:spPr>
+            <a:xfrm>
+              <a:off x="1233182" y="134692"/>
+              <a:ext cx="2614818" cy="461665"/>
+            </a:xfrm>
+            <a:prstGeom prst="rect">
+              <a:avLst/>
+            </a:prstGeom>
+            <a:noFill/>
+          </p:spPr>
+          <p:txBody>
+            <a:bodyPr wrap="none" rtlCol="0">
+              <a:spAutoFit/>
+            </a:bodyPr>
+            <a:lstStyle/>
+            <a:p>
+              <a:r>
+                <a:rPr lang="pt-BR" sz="800" b="1" dirty="0">
+                  <a:solidFill>
+                    <a:schemeClr val="accent6">
+                      <a:lumMod val="75000"/>
+                    </a:schemeClr>
+                  </a:solidFill>
+                  <a:latin typeface="Arial" panose="020B0604020202020204" pitchFamily="34" charset="0"/>
+                  <a:cs typeface="Arial" panose="020B0604020202020204" pitchFamily="34" charset="0"/>
+                </a:rPr>
+                <a:t>IBMR - Projeto Final</a:t>
+              </a:r>
+              <a:br>
+                <a:rPr lang="pt-BR" sz="800" dirty="0">
+                  <a:solidFill>
+                    <a:schemeClr val="accent6">
+                      <a:lumMod val="75000"/>
+                    </a:schemeClr>
+                  </a:solidFill>
+                  <a:latin typeface="Arial" panose="020B0604020202020204" pitchFamily="34" charset="0"/>
+                  <a:cs typeface="Arial" panose="020B0604020202020204" pitchFamily="34" charset="0"/>
+                </a:rPr>
+              </a:br>
+              <a:r>
+                <a:rPr lang="pt-BR" sz="800" b="1" dirty="0">
+                  <a:solidFill>
+                    <a:schemeClr val="accent6">
+                      <a:lumMod val="75000"/>
+                    </a:schemeClr>
+                  </a:solidFill>
+                  <a:latin typeface="Arial" panose="020B0604020202020204" pitchFamily="34" charset="0"/>
+                  <a:cs typeface="Arial" panose="020B0604020202020204" pitchFamily="34" charset="0"/>
+                </a:rPr>
+                <a:t>Curso de Análise e Desenvolvimento de sistemas</a:t>
+              </a:r>
+            </a:p>
+            <a:p>
+              <a:r>
+                <a:rPr lang="pt-BR" sz="800" b="1" dirty="0">
+                  <a:solidFill>
+                    <a:schemeClr val="accent6">
+                      <a:lumMod val="75000"/>
+                    </a:schemeClr>
+                  </a:solidFill>
+                  <a:latin typeface="Arial" panose="020B0604020202020204" pitchFamily="34" charset="0"/>
+                  <a:cs typeface="Arial" panose="020B0604020202020204" pitchFamily="34" charset="0"/>
+                </a:rPr>
+                <a:t>CADERNO DE TESTES AUTOMATIZADO</a:t>
+              </a:r>
+              <a:endParaRPr lang="pt-BR" sz="800" dirty="0">
+                <a:solidFill>
+                  <a:schemeClr val="accent6">
+                    <a:lumMod val="75000"/>
+                  </a:schemeClr>
+                </a:solidFill>
+                <a:latin typeface="Arial" panose="020B0604020202020204" pitchFamily="34" charset="0"/>
+                <a:cs typeface="Arial" panose="020B0604020202020204" pitchFamily="34" charset="0"/>
+              </a:endParaRPr>
+            </a:p>
+          </p:txBody>
+        </p:sp>
+        <p:sp>
+          <p:nvSpPr>
+            <p:cNvPr id="9" name="CaixaDeTexto 8">
+              <a:extLst>
+                <a:ext uri="{FF2B5EF4-FFF2-40B4-BE49-F238E27FC236}">
+                  <a16:creationId xmlns:a16="http://schemas.microsoft.com/office/drawing/2014/main" id="{511A8D88-4276-44AD-94BA-32D910645A52}"/>
+                </a:ext>
+              </a:extLst>
+            </p:cNvPr>
+            <p:cNvSpPr txBox="1"/>
+            <p:nvPr/>
+          </p:nvSpPr>
+          <p:spPr>
+            <a:xfrm>
+              <a:off x="1233182" y="511432"/>
+              <a:ext cx="3284874" cy="261610"/>
+            </a:xfrm>
+            <a:prstGeom prst="rect">
+              <a:avLst/>
+            </a:prstGeom>
+            <a:noFill/>
+          </p:spPr>
+          <p:txBody>
+            <a:bodyPr wrap="none" rtlCol="0">
+              <a:spAutoFit/>
+            </a:bodyPr>
+            <a:lstStyle/>
+            <a:p>
+              <a:r>
+                <a:rPr lang="pt-BR" sz="1100" b="1" dirty="0">
+                  <a:latin typeface="Arial" panose="020B0604020202020204" pitchFamily="34" charset="0"/>
+                  <a:cs typeface="Arial" panose="020B0604020202020204" pitchFamily="34" charset="0"/>
+                </a:rPr>
+                <a:t>SGEP - Sistema de Gestão de Escalas e Ponto</a:t>
+              </a:r>
+              <a:endParaRPr lang="pt-BR" sz="1100" dirty="0">
+                <a:latin typeface="Arial" panose="020B0604020202020204" pitchFamily="34" charset="0"/>
+                <a:cs typeface="Arial" panose="020B0604020202020204" pitchFamily="34" charset="0"/>
+              </a:endParaRPr>
+            </a:p>
+          </p:txBody>
+        </p:sp>
+        <p:sp>
+          <p:nvSpPr>
+            <p:cNvPr id="10" name="CaixaDeTexto 9">
+              <a:extLst>
+                <a:ext uri="{FF2B5EF4-FFF2-40B4-BE49-F238E27FC236}">
+                  <a16:creationId xmlns:a16="http://schemas.microsoft.com/office/drawing/2014/main" id="{FC779BDC-B2A7-4196-B424-F6A5BF34C4A6}"/>
+                </a:ext>
+              </a:extLst>
+            </p:cNvPr>
+            <p:cNvSpPr txBox="1"/>
+            <p:nvPr/>
+          </p:nvSpPr>
+          <p:spPr>
+            <a:xfrm>
+              <a:off x="7183890" y="461142"/>
+              <a:ext cx="1617751" cy="246221"/>
+            </a:xfrm>
+            <a:prstGeom prst="rect">
+              <a:avLst/>
+            </a:prstGeom>
+            <a:noFill/>
+          </p:spPr>
+          <p:txBody>
+            <a:bodyPr wrap="none" rtlCol="0">
+              <a:spAutoFit/>
+            </a:bodyPr>
+            <a:lstStyle/>
+            <a:p>
+              <a:pPr algn="r"/>
+              <a:r>
+                <a:rPr lang="pt-BR" sz="1000" dirty="0">
+                  <a:latin typeface="Arial" panose="020B0604020202020204" pitchFamily="34" charset="0"/>
+                  <a:cs typeface="Arial" panose="020B0604020202020204" pitchFamily="34" charset="0"/>
+                </a:rPr>
+                <a:t>IBMR - GRUPO 1 2020.2</a:t>
+              </a:r>
+            </a:p>
+          </p:txBody>
+        </p:sp>
+      </p:grpSp>
       <p:sp>
         <p:nvSpPr>
           <p:cNvPr id="13" name="CaixaDeTexto 12">
@@ -5165,7 +6305,900 @@
         </p:nvSpPr>
         <p:spPr>
           <a:xfrm>
-            <a:off x="460290" y="1015110"/>
+            <a:off x="219235" y="1149782"/>
+            <a:ext cx="6239209" cy="646331"/>
+          </a:xfrm>
+          <a:prstGeom prst="rect">
+            <a:avLst/>
+          </a:prstGeom>
+          <a:noFill/>
+        </p:spPr>
+        <p:txBody>
+          <a:bodyPr wrap="none" rtlCol="0">
+            <a:spAutoFit/>
+          </a:bodyPr>
+          <a:lstStyle/>
+          <a:p>
+            <a:pPr marL="342900" indent="-342900">
+              <a:buFont typeface="+mj-lt"/>
+              <a:buAutoNum type="arabicPeriod"/>
+            </a:pPr>
+            <a:r>
+              <a:rPr lang="pt-BR" sz="1200" dirty="0" err="1">
+                <a:latin typeface="Arial" panose="020B0604020202020204" pitchFamily="34" charset="0"/>
+                <a:cs typeface="Arial" panose="020B0604020202020204" pitchFamily="34" charset="0"/>
+              </a:rPr>
+              <a:t>Logar</a:t>
+            </a:r>
+            <a:r>
+              <a:rPr lang="pt-BR" sz="1200" dirty="0">
+                <a:latin typeface="Arial" panose="020B0604020202020204" pitchFamily="34" charset="0"/>
+                <a:cs typeface="Arial" panose="020B0604020202020204" pitchFamily="34" charset="0"/>
+              </a:rPr>
+              <a:t> no sistema, usando um </a:t>
+            </a:r>
+            <a:r>
+              <a:rPr lang="pt-BR" sz="1200" dirty="0" err="1">
+                <a:latin typeface="Arial" panose="020B0604020202020204" pitchFamily="34" charset="0"/>
+                <a:cs typeface="Arial" panose="020B0604020202020204" pitchFamily="34" charset="0"/>
+              </a:rPr>
+              <a:t>email</a:t>
+            </a:r>
+            <a:r>
+              <a:rPr lang="pt-BR" sz="1200" dirty="0">
+                <a:latin typeface="Arial" panose="020B0604020202020204" pitchFamily="34" charset="0"/>
+                <a:cs typeface="Arial" panose="020B0604020202020204" pitchFamily="34" charset="0"/>
+              </a:rPr>
+              <a:t> e senha;</a:t>
+            </a:r>
+          </a:p>
+          <a:p>
+            <a:pPr marL="342900" indent="-342900">
+              <a:buFont typeface="+mj-lt"/>
+              <a:buAutoNum type="arabicPeriod"/>
+            </a:pPr>
+            <a:r>
+              <a:rPr lang="pt-BR" sz="1200" dirty="0">
+                <a:latin typeface="Arial" panose="020B0604020202020204" pitchFamily="34" charset="0"/>
+                <a:cs typeface="Arial" panose="020B0604020202020204" pitchFamily="34" charset="0"/>
+              </a:rPr>
+              <a:t>O sistema verifica as credencias passadas, permitindo ou não o acesso ao sistema.</a:t>
+            </a:r>
+          </a:p>
+          <a:p>
+            <a:pPr marL="342900" indent="-342900">
+              <a:buFont typeface="+mj-lt"/>
+              <a:buAutoNum type="arabicPeriod"/>
+            </a:pPr>
+            <a:r>
+              <a:rPr lang="pt-BR" sz="1200" dirty="0">
+                <a:latin typeface="Arial" panose="020B0604020202020204" pitchFamily="34" charset="0"/>
+                <a:cs typeface="Arial" panose="020B0604020202020204" pitchFamily="34" charset="0"/>
+              </a:rPr>
+              <a:t>Finaliza o acesso clicando em Sair.</a:t>
+            </a:r>
+          </a:p>
+        </p:txBody>
+      </p:sp>
+      <p:pic>
+        <p:nvPicPr>
+          <p:cNvPr id="4" name="Imagem 3">
+            <a:extLst>
+              <a:ext uri="{FF2B5EF4-FFF2-40B4-BE49-F238E27FC236}">
+                <a16:creationId xmlns:a16="http://schemas.microsoft.com/office/drawing/2014/main" id="{9FFB4A73-1E71-41CB-9FDB-A938FD46B90E}"/>
+              </a:ext>
+            </a:extLst>
+          </p:cNvPr>
+          <p:cNvPicPr>
+            <a:picLocks noChangeAspect="1"/>
+          </p:cNvPicPr>
+          <p:nvPr/>
+        </p:nvPicPr>
+        <p:blipFill>
+          <a:blip r:embed="rId4"/>
+          <a:stretch>
+            <a:fillRect/>
+          </a:stretch>
+        </p:blipFill>
+        <p:spPr>
+          <a:xfrm>
+            <a:off x="219233" y="4019833"/>
+            <a:ext cx="2335845" cy="2557136"/>
+          </a:xfrm>
+          <a:prstGeom prst="rect">
+            <a:avLst/>
+          </a:prstGeom>
+        </p:spPr>
+      </p:pic>
+      <p:sp>
+        <p:nvSpPr>
+          <p:cNvPr id="14" name="CaixaDeTexto 13">
+            <a:extLst>
+              <a:ext uri="{FF2B5EF4-FFF2-40B4-BE49-F238E27FC236}">
+                <a16:creationId xmlns:a16="http://schemas.microsoft.com/office/drawing/2014/main" id="{40F6D25C-69B1-46FF-9AFF-E45927201F26}"/>
+              </a:ext>
+            </a:extLst>
+          </p:cNvPr>
+          <p:cNvSpPr txBox="1"/>
+          <p:nvPr/>
+        </p:nvSpPr>
+        <p:spPr>
+          <a:xfrm>
+            <a:off x="219235" y="855563"/>
+            <a:ext cx="2191626" cy="307777"/>
+          </a:xfrm>
+          <a:prstGeom prst="rect">
+            <a:avLst/>
+          </a:prstGeom>
+          <a:noFill/>
+        </p:spPr>
+        <p:txBody>
+          <a:bodyPr wrap="none" rtlCol="0">
+            <a:spAutoFit/>
+          </a:bodyPr>
+          <a:lstStyle/>
+          <a:p>
+            <a:r>
+              <a:rPr lang="pt-BR" sz="1400" b="1" dirty="0">
+                <a:solidFill>
+                  <a:schemeClr val="accent6">
+                    <a:lumMod val="50000"/>
+                  </a:schemeClr>
+                </a:solidFill>
+                <a:latin typeface="Arial" panose="020B0604020202020204" pitchFamily="34" charset="0"/>
+                <a:cs typeface="Arial" panose="020B0604020202020204" pitchFamily="34" charset="0"/>
+              </a:rPr>
+              <a:t>TC02 – Login com falha</a:t>
+            </a:r>
+          </a:p>
+        </p:txBody>
+      </p:sp>
+      <p:graphicFrame>
+        <p:nvGraphicFramePr>
+          <p:cNvPr id="3" name="Tabela 4">
+            <a:extLst>
+              <a:ext uri="{FF2B5EF4-FFF2-40B4-BE49-F238E27FC236}">
+                <a16:creationId xmlns:a16="http://schemas.microsoft.com/office/drawing/2014/main" id="{EAF21583-3D57-49DB-B499-7D3A84340E56}"/>
+              </a:ext>
+            </a:extLst>
+          </p:cNvPr>
+          <p:cNvGraphicFramePr>
+            <a:graphicFrameLocks noGrp="1"/>
+          </p:cNvGraphicFramePr>
+          <p:nvPr>
+            <p:extLst>
+              <p:ext uri="{D42A27DB-BD31-4B8C-83A1-F6EECF244321}">
+                <p14:modId xmlns:p14="http://schemas.microsoft.com/office/powerpoint/2010/main" val="3359104543"/>
+              </p:ext>
+            </p:extLst>
+          </p:nvPr>
+        </p:nvGraphicFramePr>
+        <p:xfrm>
+          <a:off x="219234" y="1942285"/>
+          <a:ext cx="8094255" cy="1539426"/>
+        </p:xfrm>
+        <a:graphic>
+          <a:graphicData uri="http://schemas.openxmlformats.org/drawingml/2006/table">
+            <a:tbl>
+              <a:tblPr firstRow="1" bandRow="1">
+                <a:tableStyleId>{93296810-A885-4BE3-A3E7-6D5BEEA58F35}</a:tableStyleId>
+              </a:tblPr>
+              <a:tblGrid>
+                <a:gridCol w="422990">
+                  <a:extLst>
+                    <a:ext uri="{9D8B030D-6E8A-4147-A177-3AD203B41FA5}">
+                      <a16:colId xmlns:a16="http://schemas.microsoft.com/office/drawing/2014/main" val="1736460137"/>
+                    </a:ext>
+                  </a:extLst>
+                </a:gridCol>
+                <a:gridCol w="2562370">
+                  <a:extLst>
+                    <a:ext uri="{9D8B030D-6E8A-4147-A177-3AD203B41FA5}">
+                      <a16:colId xmlns:a16="http://schemas.microsoft.com/office/drawing/2014/main" val="549836352"/>
+                    </a:ext>
+                  </a:extLst>
+                </a:gridCol>
+                <a:gridCol w="3085331">
+                  <a:extLst>
+                    <a:ext uri="{9D8B030D-6E8A-4147-A177-3AD203B41FA5}">
+                      <a16:colId xmlns:a16="http://schemas.microsoft.com/office/drawing/2014/main" val="1077555547"/>
+                    </a:ext>
+                  </a:extLst>
+                </a:gridCol>
+                <a:gridCol w="2023564">
+                  <a:extLst>
+                    <a:ext uri="{9D8B030D-6E8A-4147-A177-3AD203B41FA5}">
+                      <a16:colId xmlns:a16="http://schemas.microsoft.com/office/drawing/2014/main" val="3071683254"/>
+                    </a:ext>
+                  </a:extLst>
+                </a:gridCol>
+              </a:tblGrid>
+              <a:tr h="259173">
+                <a:tc>
+                  <a:txBody>
+                    <a:bodyPr/>
+                    <a:lstStyle/>
+                    <a:p>
+                      <a:r>
+                        <a:rPr lang="pt-BR" sz="1100" dirty="0">
+                          <a:latin typeface="Courier New" panose="02070309020205020404" pitchFamily="49" charset="0"/>
+                          <a:cs typeface="Courier New" panose="02070309020205020404" pitchFamily="49" charset="0"/>
+                        </a:rPr>
+                        <a:t>#</a:t>
+                      </a:r>
+                    </a:p>
+                  </a:txBody>
+                  <a:tcPr/>
+                </a:tc>
+                <a:tc>
+                  <a:txBody>
+                    <a:bodyPr/>
+                    <a:lstStyle/>
+                    <a:p>
+                      <a:r>
+                        <a:rPr lang="pt-BR" sz="1100" dirty="0">
+                          <a:latin typeface="Courier New" panose="02070309020205020404" pitchFamily="49" charset="0"/>
+                          <a:cs typeface="Courier New" panose="02070309020205020404" pitchFamily="49" charset="0"/>
+                        </a:rPr>
+                        <a:t>AÇÃO</a:t>
+                      </a:r>
+                    </a:p>
+                  </a:txBody>
+                  <a:tcPr/>
+                </a:tc>
+                <a:tc>
+                  <a:txBody>
+                    <a:bodyPr/>
+                    <a:lstStyle/>
+                    <a:p>
+                      <a:r>
+                        <a:rPr lang="pt-BR" sz="1100" dirty="0">
+                          <a:latin typeface="Courier New" panose="02070309020205020404" pitchFamily="49" charset="0"/>
+                          <a:cs typeface="Courier New" panose="02070309020205020404" pitchFamily="49" charset="0"/>
+                        </a:rPr>
+                        <a:t>VALOR DE ENTRADA</a:t>
+                      </a:r>
+                    </a:p>
+                  </a:txBody>
+                  <a:tcPr/>
+                </a:tc>
+                <a:tc>
+                  <a:txBody>
+                    <a:bodyPr/>
+                    <a:lstStyle/>
+                    <a:p>
+                      <a:r>
+                        <a:rPr lang="pt-BR" sz="1100" dirty="0">
+                          <a:latin typeface="Courier New" panose="02070309020205020404" pitchFamily="49" charset="0"/>
+                          <a:cs typeface="Courier New" panose="02070309020205020404" pitchFamily="49" charset="0"/>
+                        </a:rPr>
+                        <a:t>RESULTADO ESPERADO</a:t>
+                      </a:r>
+                    </a:p>
+                  </a:txBody>
+                  <a:tcPr/>
+                </a:tc>
+                <a:extLst>
+                  <a:ext uri="{0D108BD9-81ED-4DB2-BD59-A6C34878D82A}">
+                    <a16:rowId xmlns:a16="http://schemas.microsoft.com/office/drawing/2014/main" val="2518228030"/>
+                  </a:ext>
+                </a:extLst>
+              </a:tr>
+              <a:tr h="259173">
+                <a:tc>
+                  <a:txBody>
+                    <a:bodyPr/>
+                    <a:lstStyle/>
+                    <a:p>
+                      <a:r>
+                        <a:rPr lang="pt-BR" sz="1100" b="1" dirty="0">
+                          <a:latin typeface="Courier New" panose="02070309020205020404" pitchFamily="49" charset="0"/>
+                          <a:cs typeface="Courier New" panose="02070309020205020404" pitchFamily="49" charset="0"/>
+                        </a:rPr>
+                        <a:t>1</a:t>
+                      </a:r>
+                    </a:p>
+                  </a:txBody>
+                  <a:tcPr/>
+                </a:tc>
+                <a:tc>
+                  <a:txBody>
+                    <a:bodyPr/>
+                    <a:lstStyle/>
+                    <a:p>
+                      <a:r>
+                        <a:rPr lang="pt-BR" sz="1100" dirty="0">
+                          <a:latin typeface="Courier New" panose="02070309020205020404" pitchFamily="49" charset="0"/>
+                          <a:cs typeface="Courier New" panose="02070309020205020404" pitchFamily="49" charset="0"/>
+                        </a:rPr>
+                        <a:t>Digitar </a:t>
+                      </a:r>
+                      <a:r>
+                        <a:rPr lang="pt-BR" sz="1100" dirty="0" err="1">
+                          <a:latin typeface="Courier New" panose="02070309020205020404" pitchFamily="49" charset="0"/>
+                          <a:cs typeface="Courier New" panose="02070309020205020404" pitchFamily="49" charset="0"/>
+                        </a:rPr>
+                        <a:t>email</a:t>
+                      </a:r>
+                      <a:r>
+                        <a:rPr lang="pt-BR" sz="1100" dirty="0">
+                          <a:latin typeface="Courier New" panose="02070309020205020404" pitchFamily="49" charset="0"/>
+                          <a:cs typeface="Courier New" panose="02070309020205020404" pitchFamily="49" charset="0"/>
+                        </a:rPr>
+                        <a:t> no campo Usuário</a:t>
+                      </a:r>
+                    </a:p>
+                  </a:txBody>
+                  <a:tcPr/>
+                </a:tc>
+                <a:tc>
+                  <a:txBody>
+                    <a:bodyPr/>
+                    <a:lstStyle/>
+                    <a:p>
+                      <a:r>
+                        <a:rPr lang="pt-BR" sz="1100" dirty="0">
+                          <a:latin typeface="Courier New" panose="02070309020205020404" pitchFamily="49" charset="0"/>
+                          <a:cs typeface="Courier New" panose="02070309020205020404" pitchFamily="49" charset="0"/>
+                        </a:rPr>
+                        <a:t>marcio.zara@email.com</a:t>
+                      </a:r>
+                    </a:p>
+                  </a:txBody>
+                  <a:tcPr/>
+                </a:tc>
+                <a:tc>
+                  <a:txBody>
+                    <a:bodyPr/>
+                    <a:lstStyle/>
+                    <a:p>
+                      <a:r>
+                        <a:rPr lang="pt-BR" sz="1100" dirty="0">
+                          <a:latin typeface="Courier New" panose="02070309020205020404" pitchFamily="49" charset="0"/>
+                          <a:cs typeface="Courier New" panose="02070309020205020404" pitchFamily="49" charset="0"/>
+                        </a:rPr>
+                        <a:t>Nenhum</a:t>
+                      </a:r>
+                    </a:p>
+                  </a:txBody>
+                  <a:tcPr/>
+                </a:tc>
+                <a:extLst>
+                  <a:ext uri="{0D108BD9-81ED-4DB2-BD59-A6C34878D82A}">
+                    <a16:rowId xmlns:a16="http://schemas.microsoft.com/office/drawing/2014/main" val="1558016765"/>
+                  </a:ext>
+                </a:extLst>
+              </a:tr>
+              <a:tr h="259173">
+                <a:tc>
+                  <a:txBody>
+                    <a:bodyPr/>
+                    <a:lstStyle/>
+                    <a:p>
+                      <a:r>
+                        <a:rPr lang="pt-BR" sz="1100" b="1" dirty="0">
+                          <a:latin typeface="Courier New" panose="02070309020205020404" pitchFamily="49" charset="0"/>
+                          <a:cs typeface="Courier New" panose="02070309020205020404" pitchFamily="49" charset="0"/>
+                        </a:rPr>
+                        <a:t>2</a:t>
+                      </a:r>
+                    </a:p>
+                  </a:txBody>
+                  <a:tcPr/>
+                </a:tc>
+                <a:tc>
+                  <a:txBody>
+                    <a:bodyPr/>
+                    <a:lstStyle/>
+                    <a:p>
+                      <a:r>
+                        <a:rPr lang="pt-BR" sz="1100" dirty="0">
+                          <a:latin typeface="Courier New" panose="02070309020205020404" pitchFamily="49" charset="0"/>
+                          <a:cs typeface="Courier New" panose="02070309020205020404" pitchFamily="49" charset="0"/>
+                        </a:rPr>
+                        <a:t>Digitar a senha</a:t>
+                      </a:r>
+                    </a:p>
+                  </a:txBody>
+                  <a:tcPr/>
+                </a:tc>
+                <a:tc>
+                  <a:txBody>
+                    <a:bodyPr/>
+                    <a:lstStyle/>
+                    <a:p>
+                      <a:r>
+                        <a:rPr lang="pt-BR" sz="1100" dirty="0">
+                          <a:latin typeface="Courier New" panose="02070309020205020404" pitchFamily="49" charset="0"/>
+                          <a:cs typeface="Courier New" panose="02070309020205020404" pitchFamily="49" charset="0"/>
+                        </a:rPr>
+                        <a:t>Admin@2020</a:t>
+                      </a:r>
+                    </a:p>
+                  </a:txBody>
+                  <a:tcPr/>
+                </a:tc>
+                <a:tc>
+                  <a:txBody>
+                    <a:bodyPr/>
+                    <a:lstStyle/>
+                    <a:p>
+                      <a:r>
+                        <a:rPr lang="pt-BR" sz="1100" dirty="0">
+                          <a:latin typeface="Courier New" panose="02070309020205020404" pitchFamily="49" charset="0"/>
+                          <a:cs typeface="Courier New" panose="02070309020205020404" pitchFamily="49" charset="0"/>
+                        </a:rPr>
+                        <a:t>Nenhum</a:t>
+                      </a:r>
+                    </a:p>
+                  </a:txBody>
+                  <a:tcPr/>
+                </a:tc>
+                <a:extLst>
+                  <a:ext uri="{0D108BD9-81ED-4DB2-BD59-A6C34878D82A}">
+                    <a16:rowId xmlns:a16="http://schemas.microsoft.com/office/drawing/2014/main" val="362632068"/>
+                  </a:ext>
+                </a:extLst>
+              </a:tr>
+              <a:tr h="259173">
+                <a:tc>
+                  <a:txBody>
+                    <a:bodyPr/>
+                    <a:lstStyle/>
+                    <a:p>
+                      <a:r>
+                        <a:rPr lang="pt-BR" sz="1100" b="1" dirty="0">
+                          <a:latin typeface="Courier New" panose="02070309020205020404" pitchFamily="49" charset="0"/>
+                          <a:cs typeface="Courier New" panose="02070309020205020404" pitchFamily="49" charset="0"/>
+                        </a:rPr>
+                        <a:t>3</a:t>
+                      </a:r>
+                    </a:p>
+                  </a:txBody>
+                  <a:tcPr/>
+                </a:tc>
+                <a:tc>
+                  <a:txBody>
+                    <a:bodyPr/>
+                    <a:lstStyle/>
+                    <a:p>
+                      <a:r>
+                        <a:rPr lang="pt-BR" sz="1100" dirty="0">
+                          <a:latin typeface="Courier New" panose="02070309020205020404" pitchFamily="49" charset="0"/>
+                          <a:cs typeface="Courier New" panose="02070309020205020404" pitchFamily="49" charset="0"/>
+                        </a:rPr>
+                        <a:t>Clicar em entrar</a:t>
+                      </a:r>
+                    </a:p>
+                  </a:txBody>
+                  <a:tcPr/>
+                </a:tc>
+                <a:tc>
+                  <a:txBody>
+                    <a:bodyPr/>
+                    <a:lstStyle/>
+                    <a:p>
+                      <a:r>
+                        <a:rPr lang="pt-BR" sz="1100" dirty="0">
+                          <a:latin typeface="Courier New" panose="02070309020205020404" pitchFamily="49" charset="0"/>
+                          <a:cs typeface="Courier New" panose="02070309020205020404" pitchFamily="49" charset="0"/>
+                        </a:rPr>
+                        <a:t>N/A</a:t>
+                      </a:r>
+                    </a:p>
+                  </a:txBody>
+                  <a:tcPr/>
+                </a:tc>
+                <a:tc>
+                  <a:txBody>
+                    <a:bodyPr/>
+                    <a:lstStyle/>
+                    <a:p>
+                      <a:r>
+                        <a:rPr lang="pt-BR" sz="1100" dirty="0">
+                          <a:latin typeface="Courier New" panose="02070309020205020404" pitchFamily="49" charset="0"/>
+                          <a:cs typeface="Courier New" panose="02070309020205020404" pitchFamily="49" charset="0"/>
+                        </a:rPr>
+                        <a:t>Negação de acesso, com mensagem de erro 404.</a:t>
+                      </a:r>
+                    </a:p>
+                  </a:txBody>
+                  <a:tcPr/>
+                </a:tc>
+                <a:extLst>
+                  <a:ext uri="{0D108BD9-81ED-4DB2-BD59-A6C34878D82A}">
+                    <a16:rowId xmlns:a16="http://schemas.microsoft.com/office/drawing/2014/main" val="3299120065"/>
+                  </a:ext>
+                </a:extLst>
+              </a:tr>
+            </a:tbl>
+          </a:graphicData>
+        </a:graphic>
+      </p:graphicFrame>
+      <p:sp>
+        <p:nvSpPr>
+          <p:cNvPr id="17" name="CaixaDeTexto 16">
+            <a:extLst>
+              <a:ext uri="{FF2B5EF4-FFF2-40B4-BE49-F238E27FC236}">
+                <a16:creationId xmlns:a16="http://schemas.microsoft.com/office/drawing/2014/main" id="{583E71A0-B03D-4BFA-8639-592C59F4CF52}"/>
+              </a:ext>
+            </a:extLst>
+          </p:cNvPr>
+          <p:cNvSpPr txBox="1"/>
+          <p:nvPr/>
+        </p:nvSpPr>
+        <p:spPr>
+          <a:xfrm>
+            <a:off x="189740" y="3742834"/>
+            <a:ext cx="5689378" cy="276999"/>
+          </a:xfrm>
+          <a:prstGeom prst="rect">
+            <a:avLst/>
+          </a:prstGeom>
+          <a:noFill/>
+        </p:spPr>
+        <p:txBody>
+          <a:bodyPr wrap="none" rtlCol="0">
+            <a:spAutoFit/>
+          </a:bodyPr>
+          <a:lstStyle/>
+          <a:p>
+            <a:r>
+              <a:rPr lang="pt-BR" sz="1200" dirty="0">
+                <a:latin typeface="Arial" panose="020B0604020202020204" pitchFamily="34" charset="0"/>
+                <a:cs typeface="Arial" panose="020B0604020202020204" pitchFamily="34" charset="0"/>
+              </a:rPr>
+              <a:t>Nesse teste vamos validar as </a:t>
+            </a:r>
+            <a:r>
+              <a:rPr lang="pt-BR" sz="1200" dirty="0" err="1">
+                <a:latin typeface="Arial" panose="020B0604020202020204" pitchFamily="34" charset="0"/>
+                <a:cs typeface="Arial" panose="020B0604020202020204" pitchFamily="34" charset="0"/>
+              </a:rPr>
+              <a:t>as</a:t>
+            </a:r>
+            <a:r>
+              <a:rPr lang="pt-BR" sz="1200" dirty="0">
+                <a:latin typeface="Arial" panose="020B0604020202020204" pitchFamily="34" charset="0"/>
+                <a:cs typeface="Arial" panose="020B0604020202020204" pitchFamily="34" charset="0"/>
+              </a:rPr>
+              <a:t> rotinas de consulta ao banco, e tratativa de erro.</a:t>
+            </a:r>
+          </a:p>
+        </p:txBody>
+      </p:sp>
+      <p:pic>
+        <p:nvPicPr>
+          <p:cNvPr id="15" name="Imagem 14">
+            <a:extLst>
+              <a:ext uri="{FF2B5EF4-FFF2-40B4-BE49-F238E27FC236}">
+                <a16:creationId xmlns:a16="http://schemas.microsoft.com/office/drawing/2014/main" id="{73AAB232-6DDA-4D7B-A608-577832BA466C}"/>
+              </a:ext>
+            </a:extLst>
+          </p:cNvPr>
+          <p:cNvPicPr>
+            <a:picLocks noChangeAspect="1"/>
+          </p:cNvPicPr>
+          <p:nvPr/>
+        </p:nvPicPr>
+        <p:blipFill>
+          <a:blip r:embed="rId5"/>
+          <a:stretch>
+            <a:fillRect/>
+          </a:stretch>
+        </p:blipFill>
+        <p:spPr>
+          <a:xfrm>
+            <a:off x="2681675" y="4019833"/>
+            <a:ext cx="2172711" cy="2762774"/>
+          </a:xfrm>
+          <a:prstGeom prst="rect">
+            <a:avLst/>
+          </a:prstGeom>
+        </p:spPr>
+      </p:pic>
+      <p:pic>
+        <p:nvPicPr>
+          <p:cNvPr id="18" name="Imagem 17">
+            <a:extLst>
+              <a:ext uri="{FF2B5EF4-FFF2-40B4-BE49-F238E27FC236}">
+                <a16:creationId xmlns:a16="http://schemas.microsoft.com/office/drawing/2014/main" id="{C9D07C7B-C3C3-47CC-8482-92DF9C8FD128}"/>
+              </a:ext>
+            </a:extLst>
+          </p:cNvPr>
+          <p:cNvPicPr>
+            <a:picLocks noChangeAspect="1"/>
+          </p:cNvPicPr>
+          <p:nvPr/>
+        </p:nvPicPr>
+        <p:blipFill>
+          <a:blip r:embed="rId6"/>
+          <a:stretch>
+            <a:fillRect/>
+          </a:stretch>
+        </p:blipFill>
+        <p:spPr>
+          <a:xfrm>
+            <a:off x="4980983" y="4049818"/>
+            <a:ext cx="1980368" cy="2497165"/>
+          </a:xfrm>
+          <a:prstGeom prst="rect">
+            <a:avLst/>
+          </a:prstGeom>
+        </p:spPr>
+      </p:pic>
+    </p:spTree>
+    <p:extLst>
+      <p:ext uri="{BB962C8B-B14F-4D97-AF65-F5344CB8AC3E}">
+        <p14:creationId xmlns:p14="http://schemas.microsoft.com/office/powerpoint/2010/main" val="1417587163"/>
+      </p:ext>
+    </p:extLst>
+  </p:cSld>
+  <p:clrMapOvr>
+    <a:masterClrMapping/>
+  </p:clrMapOvr>
+</p:sld>
+</file>
+
+<file path=ppt/slides/slide6.xml><?xml version="1.0" encoding="utf-8"?>
+<p:sld xmlns:a="http://schemas.openxmlformats.org/drawingml/2006/main" xmlns:r="http://schemas.openxmlformats.org/officeDocument/2006/relationships" xmlns:p="http://schemas.openxmlformats.org/presentationml/2006/main">
+  <p:cSld>
+    <p:spTree>
+      <p:nvGrpSpPr>
+        <p:cNvPr id="1" name=""/>
+        <p:cNvGrpSpPr/>
+        <p:nvPr/>
+      </p:nvGrpSpPr>
+      <p:grpSpPr>
+        <a:xfrm>
+          <a:off x="0" y="0"/>
+          <a:ext cx="0" cy="0"/>
+          <a:chOff x="0" y="0"/>
+          <a:chExt cx="0" cy="0"/>
+        </a:xfrm>
+      </p:grpSpPr>
+      <p:grpSp>
+        <p:nvGrpSpPr>
+          <p:cNvPr id="11" name="Agrupar 10">
+            <a:extLst>
+              <a:ext uri="{FF2B5EF4-FFF2-40B4-BE49-F238E27FC236}">
+                <a16:creationId xmlns:a16="http://schemas.microsoft.com/office/drawing/2014/main" id="{A31A092D-861A-4222-987B-6C885E397CEA}"/>
+              </a:ext>
+            </a:extLst>
+          </p:cNvPr>
+          <p:cNvGrpSpPr/>
+          <p:nvPr/>
+        </p:nvGrpSpPr>
+        <p:grpSpPr>
+          <a:xfrm>
+            <a:off x="342358" y="42006"/>
+            <a:ext cx="8459283" cy="731036"/>
+            <a:chOff x="342358" y="42006"/>
+            <a:chExt cx="8459283" cy="731036"/>
+          </a:xfrm>
+        </p:grpSpPr>
+        <p:pic>
+          <p:nvPicPr>
+            <p:cNvPr id="7" name="Imagem 6">
+              <a:extLst>
+                <a:ext uri="{FF2B5EF4-FFF2-40B4-BE49-F238E27FC236}">
+                  <a16:creationId xmlns:a16="http://schemas.microsoft.com/office/drawing/2014/main" id="{81677A8A-DA4A-4C9A-90F9-A1A87F33632C}"/>
+                </a:ext>
+              </a:extLst>
+            </p:cNvPr>
+            <p:cNvPicPr>
+              <a:picLocks noChangeAspect="1"/>
+            </p:cNvPicPr>
+            <p:nvPr/>
+          </p:nvPicPr>
+          <p:blipFill>
+            <a:blip r:embed="rId2" r:link="rId3">
+              <a:extLst>
+                <a:ext uri="{28A0092B-C50C-407E-A947-70E740481C1C}">
+                  <a14:useLocalDpi xmlns:a14="http://schemas.microsoft.com/office/drawing/2010/main" val="0"/>
+                </a:ext>
+              </a:extLst>
+            </a:blip>
+            <a:stretch>
+              <a:fillRect/>
+            </a:stretch>
+          </p:blipFill>
+          <p:spPr>
+            <a:xfrm>
+              <a:off x="342358" y="42006"/>
+              <a:ext cx="974714" cy="731036"/>
+            </a:xfrm>
+            <a:prstGeom prst="rect">
+              <a:avLst/>
+            </a:prstGeom>
+          </p:spPr>
+        </p:pic>
+        <p:sp>
+          <p:nvSpPr>
+            <p:cNvPr id="8" name="CaixaDeTexto 7">
+              <a:extLst>
+                <a:ext uri="{FF2B5EF4-FFF2-40B4-BE49-F238E27FC236}">
+                  <a16:creationId xmlns:a16="http://schemas.microsoft.com/office/drawing/2014/main" id="{96E3142D-CAD8-424E-A180-28D52A1B91C6}"/>
+                </a:ext>
+              </a:extLst>
+            </p:cNvPr>
+            <p:cNvSpPr txBox="1"/>
+            <p:nvPr/>
+          </p:nvSpPr>
+          <p:spPr>
+            <a:xfrm>
+              <a:off x="1233182" y="134692"/>
+              <a:ext cx="2614818" cy="461665"/>
+            </a:xfrm>
+            <a:prstGeom prst="rect">
+              <a:avLst/>
+            </a:prstGeom>
+            <a:noFill/>
+          </p:spPr>
+          <p:txBody>
+            <a:bodyPr wrap="none" rtlCol="0">
+              <a:spAutoFit/>
+            </a:bodyPr>
+            <a:lstStyle/>
+            <a:p>
+              <a:r>
+                <a:rPr lang="pt-BR" sz="800" b="1" dirty="0">
+                  <a:solidFill>
+                    <a:schemeClr val="accent6">
+                      <a:lumMod val="75000"/>
+                    </a:schemeClr>
+                  </a:solidFill>
+                  <a:latin typeface="Arial" panose="020B0604020202020204" pitchFamily="34" charset="0"/>
+                  <a:cs typeface="Arial" panose="020B0604020202020204" pitchFamily="34" charset="0"/>
+                </a:rPr>
+                <a:t>IBMR - Projeto Final</a:t>
+              </a:r>
+              <a:br>
+                <a:rPr lang="pt-BR" sz="800" dirty="0">
+                  <a:solidFill>
+                    <a:schemeClr val="accent6">
+                      <a:lumMod val="75000"/>
+                    </a:schemeClr>
+                  </a:solidFill>
+                  <a:latin typeface="Arial" panose="020B0604020202020204" pitchFamily="34" charset="0"/>
+                  <a:cs typeface="Arial" panose="020B0604020202020204" pitchFamily="34" charset="0"/>
+                </a:rPr>
+              </a:br>
+              <a:r>
+                <a:rPr lang="pt-BR" sz="800" b="1" dirty="0">
+                  <a:solidFill>
+                    <a:schemeClr val="accent6">
+                      <a:lumMod val="75000"/>
+                    </a:schemeClr>
+                  </a:solidFill>
+                  <a:latin typeface="Arial" panose="020B0604020202020204" pitchFamily="34" charset="0"/>
+                  <a:cs typeface="Arial" panose="020B0604020202020204" pitchFamily="34" charset="0"/>
+                </a:rPr>
+                <a:t>Curso de Análise e Desenvolvimento de sistemas</a:t>
+              </a:r>
+            </a:p>
+            <a:p>
+              <a:r>
+                <a:rPr lang="pt-BR" sz="800" b="1" dirty="0">
+                  <a:solidFill>
+                    <a:schemeClr val="accent6">
+                      <a:lumMod val="75000"/>
+                    </a:schemeClr>
+                  </a:solidFill>
+                  <a:latin typeface="Arial" panose="020B0604020202020204" pitchFamily="34" charset="0"/>
+                  <a:cs typeface="Arial" panose="020B0604020202020204" pitchFamily="34" charset="0"/>
+                </a:rPr>
+                <a:t>CADERNO DE TESTES AUTOMATIZADO</a:t>
+              </a:r>
+              <a:endParaRPr lang="pt-BR" sz="800" dirty="0">
+                <a:solidFill>
+                  <a:schemeClr val="accent6">
+                    <a:lumMod val="75000"/>
+                  </a:schemeClr>
+                </a:solidFill>
+                <a:latin typeface="Arial" panose="020B0604020202020204" pitchFamily="34" charset="0"/>
+                <a:cs typeface="Arial" panose="020B0604020202020204" pitchFamily="34" charset="0"/>
+              </a:endParaRPr>
+            </a:p>
+          </p:txBody>
+        </p:sp>
+        <p:sp>
+          <p:nvSpPr>
+            <p:cNvPr id="9" name="CaixaDeTexto 8">
+              <a:extLst>
+                <a:ext uri="{FF2B5EF4-FFF2-40B4-BE49-F238E27FC236}">
+                  <a16:creationId xmlns:a16="http://schemas.microsoft.com/office/drawing/2014/main" id="{511A8D88-4276-44AD-94BA-32D910645A52}"/>
+                </a:ext>
+              </a:extLst>
+            </p:cNvPr>
+            <p:cNvSpPr txBox="1"/>
+            <p:nvPr/>
+          </p:nvSpPr>
+          <p:spPr>
+            <a:xfrm>
+              <a:off x="1233182" y="511432"/>
+              <a:ext cx="3284874" cy="261610"/>
+            </a:xfrm>
+            <a:prstGeom prst="rect">
+              <a:avLst/>
+            </a:prstGeom>
+            <a:noFill/>
+          </p:spPr>
+          <p:txBody>
+            <a:bodyPr wrap="none" rtlCol="0">
+              <a:spAutoFit/>
+            </a:bodyPr>
+            <a:lstStyle/>
+            <a:p>
+              <a:r>
+                <a:rPr lang="pt-BR" sz="1100" b="1" dirty="0">
+                  <a:latin typeface="Arial" panose="020B0604020202020204" pitchFamily="34" charset="0"/>
+                  <a:cs typeface="Arial" panose="020B0604020202020204" pitchFamily="34" charset="0"/>
+                </a:rPr>
+                <a:t>SGEP - Sistema de Gestão de Escalas e Ponto</a:t>
+              </a:r>
+              <a:endParaRPr lang="pt-BR" sz="1100" dirty="0">
+                <a:latin typeface="Arial" panose="020B0604020202020204" pitchFamily="34" charset="0"/>
+                <a:cs typeface="Arial" panose="020B0604020202020204" pitchFamily="34" charset="0"/>
+              </a:endParaRPr>
+            </a:p>
+          </p:txBody>
+        </p:sp>
+        <p:sp>
+          <p:nvSpPr>
+            <p:cNvPr id="10" name="CaixaDeTexto 9">
+              <a:extLst>
+                <a:ext uri="{FF2B5EF4-FFF2-40B4-BE49-F238E27FC236}">
+                  <a16:creationId xmlns:a16="http://schemas.microsoft.com/office/drawing/2014/main" id="{FC779BDC-B2A7-4196-B424-F6A5BF34C4A6}"/>
+                </a:ext>
+              </a:extLst>
+            </p:cNvPr>
+            <p:cNvSpPr txBox="1"/>
+            <p:nvPr/>
+          </p:nvSpPr>
+          <p:spPr>
+            <a:xfrm>
+              <a:off x="7183890" y="461142"/>
+              <a:ext cx="1617751" cy="246221"/>
+            </a:xfrm>
+            <a:prstGeom prst="rect">
+              <a:avLst/>
+            </a:prstGeom>
+            <a:noFill/>
+          </p:spPr>
+          <p:txBody>
+            <a:bodyPr wrap="none" rtlCol="0">
+              <a:spAutoFit/>
+            </a:bodyPr>
+            <a:lstStyle/>
+            <a:p>
+              <a:pPr algn="r"/>
+              <a:r>
+                <a:rPr lang="pt-BR" sz="1000" dirty="0">
+                  <a:latin typeface="Arial" panose="020B0604020202020204" pitchFamily="34" charset="0"/>
+                  <a:cs typeface="Arial" panose="020B0604020202020204" pitchFamily="34" charset="0"/>
+                </a:rPr>
+                <a:t>IBMR - GRUPO 1 2020.2</a:t>
+              </a:r>
+            </a:p>
+          </p:txBody>
+        </p:sp>
+      </p:grpSp>
+      <p:sp>
+        <p:nvSpPr>
+          <p:cNvPr id="13" name="CaixaDeTexto 12">
+            <a:extLst>
+              <a:ext uri="{FF2B5EF4-FFF2-40B4-BE49-F238E27FC236}">
+                <a16:creationId xmlns:a16="http://schemas.microsoft.com/office/drawing/2014/main" id="{F4FB8751-C068-4690-A1CE-8DD24E400495}"/>
+              </a:ext>
+            </a:extLst>
+          </p:cNvPr>
+          <p:cNvSpPr txBox="1"/>
+          <p:nvPr/>
+        </p:nvSpPr>
+        <p:spPr>
+          <a:xfrm>
+            <a:off x="219234" y="973097"/>
             <a:ext cx="6239209" cy="1015663"/>
           </a:xfrm>
           <a:prstGeom prst="rect">
@@ -5235,7 +7268,21 @@
                 <a:latin typeface="Arial" panose="020B0604020202020204" pitchFamily="34" charset="0"/>
                 <a:cs typeface="Arial" panose="020B0604020202020204" pitchFamily="34" charset="0"/>
               </a:rPr>
-              <a:t>Após logado o usuário clica no botão entrada, para marcar sua entrada no trabalho;</a:t>
+              <a:t>Usuário logado clica em </a:t>
+            </a:r>
+            <a:r>
+              <a:rPr lang="pt-BR" sz="1200" dirty="0" err="1">
+                <a:latin typeface="Arial" panose="020B0604020202020204" pitchFamily="34" charset="0"/>
+                <a:cs typeface="Arial" panose="020B0604020202020204" pitchFamily="34" charset="0"/>
+              </a:rPr>
+              <a:t>Lancar</a:t>
+            </a:r>
+            <a:r>
+              <a:rPr lang="pt-BR" sz="1200" dirty="0">
+                <a:latin typeface="Arial" panose="020B0604020202020204" pitchFamily="34" charset="0"/>
+                <a:cs typeface="Arial" panose="020B0604020202020204" pitchFamily="34" charset="0"/>
+              </a:rPr>
+              <a:t> entrada;</a:t>
             </a:r>
           </a:p>
           <a:p>
@@ -5248,7 +7295,7 @@
                 <a:latin typeface="Arial" panose="020B0604020202020204" pitchFamily="34" charset="0"/>
                 <a:cs typeface="Arial" panose="020B0604020202020204" pitchFamily="34" charset="0"/>
               </a:rPr>
-              <a:t>E quando finalizar a jornada de trabalho, clica no botão para encerrar jornada.</a:t>
+              <a:t>Usuário logado clica em Lançar saída;</a:t>
             </a:r>
           </a:p>
           <a:p>
@@ -5266,6 +7313,907 @@
           </a:p>
         </p:txBody>
       </p:sp>
+      <p:pic>
+        <p:nvPicPr>
+          <p:cNvPr id="4" name="Imagem 3">
+            <a:extLst>
+              <a:ext uri="{FF2B5EF4-FFF2-40B4-BE49-F238E27FC236}">
+                <a16:creationId xmlns:a16="http://schemas.microsoft.com/office/drawing/2014/main" id="{9FFB4A73-1E71-41CB-9FDB-A938FD46B90E}"/>
+              </a:ext>
+            </a:extLst>
+          </p:cNvPr>
+          <p:cNvPicPr>
+            <a:picLocks noChangeAspect="1"/>
+          </p:cNvPicPr>
+          <p:nvPr/>
+        </p:nvPicPr>
+        <p:blipFill>
+          <a:blip r:embed="rId4"/>
+          <a:stretch>
+            <a:fillRect/>
+          </a:stretch>
+        </p:blipFill>
+        <p:spPr>
+          <a:xfrm>
+            <a:off x="219235" y="4164623"/>
+            <a:ext cx="2259168" cy="2473195"/>
+          </a:xfrm>
+          <a:prstGeom prst="rect">
+            <a:avLst/>
+          </a:prstGeom>
+        </p:spPr>
+      </p:pic>
+      <p:sp>
+        <p:nvSpPr>
+          <p:cNvPr id="14" name="CaixaDeTexto 13">
+            <a:extLst>
+              <a:ext uri="{FF2B5EF4-FFF2-40B4-BE49-F238E27FC236}">
+                <a16:creationId xmlns:a16="http://schemas.microsoft.com/office/drawing/2014/main" id="{40F6D25C-69B1-46FF-9AFF-E45927201F26}"/>
+              </a:ext>
+            </a:extLst>
+          </p:cNvPr>
+          <p:cNvSpPr txBox="1"/>
+          <p:nvPr/>
+        </p:nvSpPr>
+        <p:spPr>
+          <a:xfrm>
+            <a:off x="219234" y="758444"/>
+            <a:ext cx="5004896" cy="307777"/>
+          </a:xfrm>
+          <a:prstGeom prst="rect">
+            <a:avLst/>
+          </a:prstGeom>
+          <a:noFill/>
+        </p:spPr>
+        <p:txBody>
+          <a:bodyPr wrap="none" rtlCol="0">
+            <a:spAutoFit/>
+          </a:bodyPr>
+          <a:lstStyle/>
+          <a:p>
+            <a:r>
+              <a:rPr lang="pt-BR" sz="1400" b="1" dirty="0">
+                <a:solidFill>
+                  <a:schemeClr val="accent6">
+                    <a:lumMod val="50000"/>
+                  </a:schemeClr>
+                </a:solidFill>
+                <a:latin typeface="Arial" panose="020B0604020202020204" pitchFamily="34" charset="0"/>
+                <a:cs typeface="Arial" panose="020B0604020202020204" pitchFamily="34" charset="0"/>
+              </a:rPr>
+              <a:t>TC03 – Registro de entrada e saída (Registro de jornada)</a:t>
+            </a:r>
+          </a:p>
+        </p:txBody>
+      </p:sp>
+      <p:graphicFrame>
+        <p:nvGraphicFramePr>
+          <p:cNvPr id="3" name="Tabela 4">
+            <a:extLst>
+              <a:ext uri="{FF2B5EF4-FFF2-40B4-BE49-F238E27FC236}">
+                <a16:creationId xmlns:a16="http://schemas.microsoft.com/office/drawing/2014/main" id="{EAF21583-3D57-49DB-B499-7D3A84340E56}"/>
+              </a:ext>
+            </a:extLst>
+          </p:cNvPr>
+          <p:cNvGraphicFramePr>
+            <a:graphicFrameLocks noGrp="1"/>
+          </p:cNvGraphicFramePr>
+          <p:nvPr>
+            <p:extLst>
+              <p:ext uri="{D42A27DB-BD31-4B8C-83A1-F6EECF244321}">
+                <p14:modId xmlns:p14="http://schemas.microsoft.com/office/powerpoint/2010/main" val="2030064899"/>
+              </p:ext>
+            </p:extLst>
+          </p:nvPr>
+        </p:nvGraphicFramePr>
+        <p:xfrm>
+          <a:off x="219234" y="1959746"/>
+          <a:ext cx="8705531" cy="2392959"/>
+        </p:xfrm>
+        <a:graphic>
+          <a:graphicData uri="http://schemas.openxmlformats.org/drawingml/2006/table">
+            <a:tbl>
+              <a:tblPr firstRow="1" bandRow="1">
+                <a:tableStyleId>{93296810-A885-4BE3-A3E7-6D5BEEA58F35}</a:tableStyleId>
+              </a:tblPr>
+              <a:tblGrid>
+                <a:gridCol w="454934">
+                  <a:extLst>
+                    <a:ext uri="{9D8B030D-6E8A-4147-A177-3AD203B41FA5}">
+                      <a16:colId xmlns:a16="http://schemas.microsoft.com/office/drawing/2014/main" val="1736460137"/>
+                    </a:ext>
+                  </a:extLst>
+                </a:gridCol>
+                <a:gridCol w="2597538">
+                  <a:extLst>
+                    <a:ext uri="{9D8B030D-6E8A-4147-A177-3AD203B41FA5}">
+                      <a16:colId xmlns:a16="http://schemas.microsoft.com/office/drawing/2014/main" val="549836352"/>
+                    </a:ext>
+                  </a:extLst>
+                </a:gridCol>
+                <a:gridCol w="3078760">
+                  <a:extLst>
+                    <a:ext uri="{9D8B030D-6E8A-4147-A177-3AD203B41FA5}">
+                      <a16:colId xmlns:a16="http://schemas.microsoft.com/office/drawing/2014/main" val="1077555547"/>
+                    </a:ext>
+                  </a:extLst>
+                </a:gridCol>
+                <a:gridCol w="2574299">
+                  <a:extLst>
+                    <a:ext uri="{9D8B030D-6E8A-4147-A177-3AD203B41FA5}">
+                      <a16:colId xmlns:a16="http://schemas.microsoft.com/office/drawing/2014/main" val="3071683254"/>
+                    </a:ext>
+                  </a:extLst>
+                </a:gridCol>
+              </a:tblGrid>
+              <a:tr h="259173">
+                <a:tc>
+                  <a:txBody>
+                    <a:bodyPr/>
+                    <a:lstStyle/>
+                    <a:p>
+                      <a:r>
+                        <a:rPr lang="pt-BR" sz="1100" dirty="0">
+                          <a:latin typeface="Courier New" panose="02070309020205020404" pitchFamily="49" charset="0"/>
+                          <a:cs typeface="Courier New" panose="02070309020205020404" pitchFamily="49" charset="0"/>
+                        </a:rPr>
+                        <a:t>#</a:t>
+                      </a:r>
+                    </a:p>
+                  </a:txBody>
+                  <a:tcPr/>
+                </a:tc>
+                <a:tc>
+                  <a:txBody>
+                    <a:bodyPr/>
+                    <a:lstStyle/>
+                    <a:p>
+                      <a:r>
+                        <a:rPr lang="pt-BR" sz="1100" dirty="0">
+                          <a:latin typeface="Courier New" panose="02070309020205020404" pitchFamily="49" charset="0"/>
+                          <a:cs typeface="Courier New" panose="02070309020205020404" pitchFamily="49" charset="0"/>
+                        </a:rPr>
+                        <a:t>AÇÃO</a:t>
+                      </a:r>
+                    </a:p>
+                  </a:txBody>
+                  <a:tcPr/>
+                </a:tc>
+                <a:tc>
+                  <a:txBody>
+                    <a:bodyPr/>
+                    <a:lstStyle/>
+                    <a:p>
+                      <a:r>
+                        <a:rPr lang="pt-BR" sz="1100" dirty="0">
+                          <a:latin typeface="Courier New" panose="02070309020205020404" pitchFamily="49" charset="0"/>
+                          <a:cs typeface="Courier New" panose="02070309020205020404" pitchFamily="49" charset="0"/>
+                        </a:rPr>
+                        <a:t>VALOR DE ENTRADA</a:t>
+                      </a:r>
+                    </a:p>
+                  </a:txBody>
+                  <a:tcPr/>
+                </a:tc>
+                <a:tc>
+                  <a:txBody>
+                    <a:bodyPr/>
+                    <a:lstStyle/>
+                    <a:p>
+                      <a:r>
+                        <a:rPr lang="pt-BR" sz="1100" dirty="0">
+                          <a:latin typeface="Courier New" panose="02070309020205020404" pitchFamily="49" charset="0"/>
+                          <a:cs typeface="Courier New" panose="02070309020205020404" pitchFamily="49" charset="0"/>
+                        </a:rPr>
+                        <a:t>RESULTADO ESPERADO</a:t>
+                      </a:r>
+                    </a:p>
+                  </a:txBody>
+                  <a:tcPr/>
+                </a:tc>
+                <a:extLst>
+                  <a:ext uri="{0D108BD9-81ED-4DB2-BD59-A6C34878D82A}">
+                    <a16:rowId xmlns:a16="http://schemas.microsoft.com/office/drawing/2014/main" val="2518228030"/>
+                  </a:ext>
+                </a:extLst>
+              </a:tr>
+              <a:tr h="259173">
+                <a:tc>
+                  <a:txBody>
+                    <a:bodyPr/>
+                    <a:lstStyle/>
+                    <a:p>
+                      <a:r>
+                        <a:rPr lang="pt-BR" sz="1100" b="1" dirty="0">
+                          <a:latin typeface="Courier New" panose="02070309020205020404" pitchFamily="49" charset="0"/>
+                          <a:cs typeface="Courier New" panose="02070309020205020404" pitchFamily="49" charset="0"/>
+                        </a:rPr>
+                        <a:t>1</a:t>
+                      </a:r>
+                    </a:p>
+                  </a:txBody>
+                  <a:tcPr/>
+                </a:tc>
+                <a:tc>
+                  <a:txBody>
+                    <a:bodyPr/>
+                    <a:lstStyle/>
+                    <a:p>
+                      <a:r>
+                        <a:rPr lang="pt-BR" sz="1100" dirty="0">
+                          <a:latin typeface="Courier New" panose="02070309020205020404" pitchFamily="49" charset="0"/>
+                          <a:cs typeface="Courier New" panose="02070309020205020404" pitchFamily="49" charset="0"/>
+                        </a:rPr>
+                        <a:t>Digitar </a:t>
+                      </a:r>
+                      <a:r>
+                        <a:rPr lang="pt-BR" sz="1100" dirty="0" err="1">
+                          <a:latin typeface="Courier New" panose="02070309020205020404" pitchFamily="49" charset="0"/>
+                          <a:cs typeface="Courier New" panose="02070309020205020404" pitchFamily="49" charset="0"/>
+                        </a:rPr>
+                        <a:t>email</a:t>
+                      </a:r>
+                      <a:r>
+                        <a:rPr lang="pt-BR" sz="1100" dirty="0">
+                          <a:latin typeface="Courier New" panose="02070309020205020404" pitchFamily="49" charset="0"/>
+                          <a:cs typeface="Courier New" panose="02070309020205020404" pitchFamily="49" charset="0"/>
+                        </a:rPr>
+                        <a:t> no campo Usuário</a:t>
+                      </a:r>
+                    </a:p>
+                  </a:txBody>
+                  <a:tcPr/>
+                </a:tc>
+                <a:tc>
+                  <a:txBody>
+                    <a:bodyPr/>
+                    <a:lstStyle/>
+                    <a:p>
+                      <a:r>
+                        <a:rPr lang="pt-BR" sz="1100" dirty="0">
+                          <a:latin typeface="Courier New" panose="02070309020205020404" pitchFamily="49" charset="0"/>
+                          <a:cs typeface="Courier New" panose="02070309020205020404" pitchFamily="49" charset="0"/>
+                        </a:rPr>
+                        <a:t>ipsum.primis@velvulputateeu.edu</a:t>
+                      </a:r>
+                    </a:p>
+                  </a:txBody>
+                  <a:tcPr/>
+                </a:tc>
+                <a:tc>
+                  <a:txBody>
+                    <a:bodyPr/>
+                    <a:lstStyle/>
+                    <a:p>
+                      <a:endParaRPr lang="pt-BR" sz="1100">
+                        <a:latin typeface="Courier New" panose="02070309020205020404" pitchFamily="49" charset="0"/>
+                        <a:cs typeface="Courier New" panose="02070309020205020404" pitchFamily="49" charset="0"/>
+                      </a:endParaRPr>
+                    </a:p>
+                  </a:txBody>
+                  <a:tcPr/>
+                </a:tc>
+                <a:extLst>
+                  <a:ext uri="{0D108BD9-81ED-4DB2-BD59-A6C34878D82A}">
+                    <a16:rowId xmlns:a16="http://schemas.microsoft.com/office/drawing/2014/main" val="1558016765"/>
+                  </a:ext>
+                </a:extLst>
+              </a:tr>
+              <a:tr h="259173">
+                <a:tc>
+                  <a:txBody>
+                    <a:bodyPr/>
+                    <a:lstStyle/>
+                    <a:p>
+                      <a:r>
+                        <a:rPr lang="pt-BR" sz="1100" b="1" dirty="0">
+                          <a:latin typeface="Courier New" panose="02070309020205020404" pitchFamily="49" charset="0"/>
+                          <a:cs typeface="Courier New" panose="02070309020205020404" pitchFamily="49" charset="0"/>
+                        </a:rPr>
+                        <a:t>2</a:t>
+                      </a:r>
+                    </a:p>
+                  </a:txBody>
+                  <a:tcPr/>
+                </a:tc>
+                <a:tc>
+                  <a:txBody>
+                    <a:bodyPr/>
+                    <a:lstStyle/>
+                    <a:p>
+                      <a:r>
+                        <a:rPr lang="pt-BR" sz="1100" dirty="0">
+                          <a:latin typeface="Courier New" panose="02070309020205020404" pitchFamily="49" charset="0"/>
+                          <a:cs typeface="Courier New" panose="02070309020205020404" pitchFamily="49" charset="0"/>
+                        </a:rPr>
+                        <a:t>Digitar a senha</a:t>
+                      </a:r>
+                    </a:p>
+                  </a:txBody>
+                  <a:tcPr/>
+                </a:tc>
+                <a:tc>
+                  <a:txBody>
+                    <a:bodyPr/>
+                    <a:lstStyle/>
+                    <a:p>
+                      <a:r>
+                        <a:rPr lang="pt-BR" sz="1100" dirty="0">
+                          <a:latin typeface="Courier New" panose="02070309020205020404" pitchFamily="49" charset="0"/>
+                          <a:cs typeface="Courier New" panose="02070309020205020404" pitchFamily="49" charset="0"/>
+                        </a:rPr>
+                        <a:t>SRA27GAX6TA</a:t>
+                      </a:r>
+                    </a:p>
+                  </a:txBody>
+                  <a:tcPr/>
+                </a:tc>
+                <a:tc>
+                  <a:txBody>
+                    <a:bodyPr/>
+                    <a:lstStyle/>
+                    <a:p>
+                      <a:endParaRPr lang="pt-BR" sz="1100">
+                        <a:latin typeface="Courier New" panose="02070309020205020404" pitchFamily="49" charset="0"/>
+                        <a:cs typeface="Courier New" panose="02070309020205020404" pitchFamily="49" charset="0"/>
+                      </a:endParaRPr>
+                    </a:p>
+                  </a:txBody>
+                  <a:tcPr/>
+                </a:tc>
+                <a:extLst>
+                  <a:ext uri="{0D108BD9-81ED-4DB2-BD59-A6C34878D82A}">
+                    <a16:rowId xmlns:a16="http://schemas.microsoft.com/office/drawing/2014/main" val="362632068"/>
+                  </a:ext>
+                </a:extLst>
+              </a:tr>
+              <a:tr h="259173">
+                <a:tc>
+                  <a:txBody>
+                    <a:bodyPr/>
+                    <a:lstStyle/>
+                    <a:p>
+                      <a:r>
+                        <a:rPr lang="pt-BR" sz="1100" b="1" dirty="0">
+                          <a:latin typeface="Courier New" panose="02070309020205020404" pitchFamily="49" charset="0"/>
+                          <a:cs typeface="Courier New" panose="02070309020205020404" pitchFamily="49" charset="0"/>
+                        </a:rPr>
+                        <a:t>3</a:t>
+                      </a:r>
+                    </a:p>
+                  </a:txBody>
+                  <a:tcPr/>
+                </a:tc>
+                <a:tc>
+                  <a:txBody>
+                    <a:bodyPr/>
+                    <a:lstStyle/>
+                    <a:p>
+                      <a:r>
+                        <a:rPr lang="pt-BR" sz="1100" dirty="0">
+                          <a:latin typeface="Courier New" panose="02070309020205020404" pitchFamily="49" charset="0"/>
+                          <a:cs typeface="Courier New" panose="02070309020205020404" pitchFamily="49" charset="0"/>
+                        </a:rPr>
+                        <a:t>Clicar em Lançar Entrada</a:t>
+                      </a:r>
+                    </a:p>
+                  </a:txBody>
+                  <a:tcPr/>
+                </a:tc>
+                <a:tc>
+                  <a:txBody>
+                    <a:bodyPr/>
+                    <a:lstStyle/>
+                    <a:p>
+                      <a:r>
+                        <a:rPr lang="pt-BR" sz="1100" dirty="0">
+                          <a:latin typeface="Courier New" panose="02070309020205020404" pitchFamily="49" charset="0"/>
+                          <a:cs typeface="Courier New" panose="02070309020205020404" pitchFamily="49" charset="0"/>
+                        </a:rPr>
+                        <a:t>(O sistema captura data e hora local do cliente )</a:t>
+                      </a:r>
+                    </a:p>
+                  </a:txBody>
+                  <a:tcPr/>
+                </a:tc>
+                <a:tc>
+                  <a:txBody>
+                    <a:bodyPr/>
+                    <a:lstStyle/>
+                    <a:p>
+                      <a:r>
+                        <a:rPr lang="pt-BR" sz="1100" dirty="0">
+                          <a:latin typeface="Courier New" panose="02070309020205020404" pitchFamily="49" charset="0"/>
+                          <a:cs typeface="Courier New" panose="02070309020205020404" pitchFamily="49" charset="0"/>
+                        </a:rPr>
+                        <a:t>Mensagem de Confirmação de lançamento, e Mensagem de dados gravados com sucesso.</a:t>
+                      </a:r>
+                    </a:p>
+                  </a:txBody>
+                  <a:tcPr/>
+                </a:tc>
+                <a:extLst>
+                  <a:ext uri="{0D108BD9-81ED-4DB2-BD59-A6C34878D82A}">
+                    <a16:rowId xmlns:a16="http://schemas.microsoft.com/office/drawing/2014/main" val="3299120065"/>
+                  </a:ext>
+                </a:extLst>
+              </a:tr>
+              <a:tr h="259173">
+                <a:tc>
+                  <a:txBody>
+                    <a:bodyPr/>
+                    <a:lstStyle/>
+                    <a:p>
+                      <a:r>
+                        <a:rPr lang="pt-BR" sz="1100" b="1" dirty="0">
+                          <a:latin typeface="Courier New" panose="02070309020205020404" pitchFamily="49" charset="0"/>
+                          <a:cs typeface="Courier New" panose="02070309020205020404" pitchFamily="49" charset="0"/>
+                        </a:rPr>
+                        <a:t>4</a:t>
+                      </a:r>
+                    </a:p>
+                  </a:txBody>
+                  <a:tcPr/>
+                </a:tc>
+                <a:tc>
+                  <a:txBody>
+                    <a:bodyPr/>
+                    <a:lstStyle/>
+                    <a:p>
+                      <a:r>
+                        <a:rPr lang="pt-BR" sz="1100" dirty="0">
+                          <a:latin typeface="Courier New" panose="02070309020205020404" pitchFamily="49" charset="0"/>
+                          <a:cs typeface="Courier New" panose="02070309020205020404" pitchFamily="49" charset="0"/>
+                        </a:rPr>
+                        <a:t>Clicar em Lançar Saída</a:t>
+                      </a:r>
+                    </a:p>
+                  </a:txBody>
+                  <a:tcPr/>
+                </a:tc>
+                <a:tc>
+                  <a:txBody>
+                    <a:bodyPr/>
+                    <a:lstStyle/>
+                    <a:p>
+                      <a:r>
+                        <a:rPr lang="pt-BR" sz="1100" dirty="0">
+                          <a:latin typeface="Courier New" panose="02070309020205020404" pitchFamily="49" charset="0"/>
+                          <a:cs typeface="Courier New" panose="02070309020205020404" pitchFamily="49" charset="0"/>
+                        </a:rPr>
+                        <a:t>(O sistema captura data e hora local do cliente )</a:t>
+                      </a:r>
+                    </a:p>
+                  </a:txBody>
+                  <a:tcPr/>
+                </a:tc>
+                <a:tc>
+                  <a:txBody>
+                    <a:bodyPr/>
+                    <a:lstStyle/>
+                    <a:p>
+                      <a:r>
+                        <a:rPr lang="pt-BR" sz="1100" dirty="0">
+                          <a:latin typeface="Courier New" panose="02070309020205020404" pitchFamily="49" charset="0"/>
+                          <a:cs typeface="Courier New" panose="02070309020205020404" pitchFamily="49" charset="0"/>
+                        </a:rPr>
+                        <a:t>Mensagem de Confirmação de lançamento, e Mensagem de dados gravados com sucesso.</a:t>
+                      </a:r>
+                    </a:p>
+                  </a:txBody>
+                  <a:tcPr/>
+                </a:tc>
+                <a:extLst>
+                  <a:ext uri="{0D108BD9-81ED-4DB2-BD59-A6C34878D82A}">
+                    <a16:rowId xmlns:a16="http://schemas.microsoft.com/office/drawing/2014/main" val="602460712"/>
+                  </a:ext>
+                </a:extLst>
+              </a:tr>
+              <a:tr h="259173">
+                <a:tc>
+                  <a:txBody>
+                    <a:bodyPr/>
+                    <a:lstStyle/>
+                    <a:p>
+                      <a:r>
+                        <a:rPr lang="pt-BR" sz="1100" b="1" dirty="0">
+                          <a:latin typeface="Courier New" panose="02070309020205020404" pitchFamily="49" charset="0"/>
+                          <a:cs typeface="Courier New" panose="02070309020205020404" pitchFamily="49" charset="0"/>
+                        </a:rPr>
+                        <a:t>5</a:t>
+                      </a:r>
+                    </a:p>
+                  </a:txBody>
+                  <a:tcPr/>
+                </a:tc>
+                <a:tc>
+                  <a:txBody>
+                    <a:bodyPr/>
+                    <a:lstStyle/>
+                    <a:p>
+                      <a:r>
+                        <a:rPr lang="pt-BR" sz="1100" dirty="0">
+                          <a:latin typeface="Courier New" panose="02070309020205020404" pitchFamily="49" charset="0"/>
+                          <a:cs typeface="Courier New" panose="02070309020205020404" pitchFamily="49" charset="0"/>
+                        </a:rPr>
+                        <a:t>Clicar em Sair</a:t>
+                      </a:r>
+                    </a:p>
+                  </a:txBody>
+                  <a:tcPr/>
+                </a:tc>
+                <a:tc>
+                  <a:txBody>
+                    <a:bodyPr/>
+                    <a:lstStyle/>
+                    <a:p>
+                      <a:r>
+                        <a:rPr lang="pt-BR" sz="1100" dirty="0">
+                          <a:latin typeface="Courier New" panose="02070309020205020404" pitchFamily="49" charset="0"/>
+                          <a:cs typeface="Courier New" panose="02070309020205020404" pitchFamily="49" charset="0"/>
+                        </a:rPr>
+                        <a:t>N/A</a:t>
+                      </a:r>
+                    </a:p>
+                  </a:txBody>
+                  <a:tcPr/>
+                </a:tc>
+                <a:tc>
+                  <a:txBody>
+                    <a:bodyPr/>
+                    <a:lstStyle/>
+                    <a:p>
+                      <a:r>
+                        <a:rPr lang="pt-BR" sz="1100" dirty="0">
+                          <a:latin typeface="Courier New" panose="02070309020205020404" pitchFamily="49" charset="0"/>
+                          <a:cs typeface="Courier New" panose="02070309020205020404" pitchFamily="49" charset="0"/>
+                        </a:rPr>
+                        <a:t>Saída do sistema</a:t>
+                      </a:r>
+                    </a:p>
+                  </a:txBody>
+                  <a:tcPr/>
+                </a:tc>
+                <a:extLst>
+                  <a:ext uri="{0D108BD9-81ED-4DB2-BD59-A6C34878D82A}">
+                    <a16:rowId xmlns:a16="http://schemas.microsoft.com/office/drawing/2014/main" val="3823255808"/>
+                  </a:ext>
+                </a:extLst>
+              </a:tr>
+            </a:tbl>
+          </a:graphicData>
+        </a:graphic>
+      </p:graphicFrame>
+      <p:pic>
+        <p:nvPicPr>
+          <p:cNvPr id="5" name="Imagem 4">
+            <a:extLst>
+              <a:ext uri="{FF2B5EF4-FFF2-40B4-BE49-F238E27FC236}">
+                <a16:creationId xmlns:a16="http://schemas.microsoft.com/office/drawing/2014/main" id="{32FE6840-4C47-4726-9CFA-C1DF5827D2FE}"/>
+              </a:ext>
+            </a:extLst>
+          </p:cNvPr>
+          <p:cNvPicPr>
+            <a:picLocks noChangeAspect="1"/>
+          </p:cNvPicPr>
+          <p:nvPr/>
+        </p:nvPicPr>
+        <p:blipFill>
+          <a:blip r:embed="rId5"/>
+          <a:stretch>
+            <a:fillRect/>
+          </a:stretch>
+        </p:blipFill>
+        <p:spPr>
+          <a:xfrm>
+            <a:off x="3369581" y="4649600"/>
+            <a:ext cx="2700802" cy="1691322"/>
+          </a:xfrm>
+          <a:prstGeom prst="rect">
+            <a:avLst/>
+          </a:prstGeom>
+        </p:spPr>
+      </p:pic>
+      <p:sp>
+        <p:nvSpPr>
+          <p:cNvPr id="28" name="CaixaDeTexto 27">
+            <a:extLst>
+              <a:ext uri="{FF2B5EF4-FFF2-40B4-BE49-F238E27FC236}">
+                <a16:creationId xmlns:a16="http://schemas.microsoft.com/office/drawing/2014/main" id="{C0759B8E-A777-4699-93F2-017B70F76493}"/>
+              </a:ext>
+            </a:extLst>
+          </p:cNvPr>
+          <p:cNvSpPr txBox="1"/>
+          <p:nvPr/>
+        </p:nvSpPr>
+        <p:spPr>
+          <a:xfrm>
+            <a:off x="6484673" y="6330041"/>
+            <a:ext cx="2440092" cy="307777"/>
+          </a:xfrm>
+          <a:prstGeom prst="rect">
+            <a:avLst/>
+          </a:prstGeom>
+          <a:noFill/>
+        </p:spPr>
+        <p:txBody>
+          <a:bodyPr wrap="none" rtlCol="0">
+            <a:spAutoFit/>
+          </a:bodyPr>
+          <a:lstStyle/>
+          <a:p>
+            <a:r>
+              <a:rPr lang="pt-BR" sz="1400" b="1" dirty="0">
+                <a:solidFill>
+                  <a:schemeClr val="accent6">
+                    <a:lumMod val="50000"/>
+                  </a:schemeClr>
+                </a:solidFill>
+                <a:latin typeface="Arial" panose="020B0604020202020204" pitchFamily="34" charset="0"/>
+                <a:cs typeface="Arial" panose="020B0604020202020204" pitchFamily="34" charset="0"/>
+              </a:rPr>
+              <a:t>Continua no próximo slide</a:t>
+            </a:r>
+          </a:p>
+        </p:txBody>
+      </p:sp>
+    </p:spTree>
+    <p:extLst>
+      <p:ext uri="{BB962C8B-B14F-4D97-AF65-F5344CB8AC3E}">
+        <p14:creationId xmlns:p14="http://schemas.microsoft.com/office/powerpoint/2010/main" val="3754633359"/>
+      </p:ext>
+    </p:extLst>
+  </p:cSld>
+  <p:clrMapOvr>
+    <a:masterClrMapping/>
+  </p:clrMapOvr>
+</p:sld>
+</file>
+
+<file path=ppt/slides/slide7.xml><?xml version="1.0" encoding="utf-8"?>
+<p:sld xmlns:a="http://schemas.openxmlformats.org/drawingml/2006/main" xmlns:r="http://schemas.openxmlformats.org/officeDocument/2006/relationships" xmlns:p="http://schemas.openxmlformats.org/presentationml/2006/main">
+  <p:cSld>
+    <p:spTree>
+      <p:nvGrpSpPr>
+        <p:cNvPr id="1" name=""/>
+        <p:cNvGrpSpPr/>
+        <p:nvPr/>
+      </p:nvGrpSpPr>
+      <p:grpSpPr>
+        <a:xfrm>
+          <a:off x="0" y="0"/>
+          <a:ext cx="0" cy="0"/>
+          <a:chOff x="0" y="0"/>
+          <a:chExt cx="0" cy="0"/>
+        </a:xfrm>
+      </p:grpSpPr>
+      <p:grpSp>
+        <p:nvGrpSpPr>
+          <p:cNvPr id="11" name="Agrupar 10">
+            <a:extLst>
+              <a:ext uri="{FF2B5EF4-FFF2-40B4-BE49-F238E27FC236}">
+                <a16:creationId xmlns:a16="http://schemas.microsoft.com/office/drawing/2014/main" id="{A31A092D-861A-4222-987B-6C885E397CEA}"/>
+              </a:ext>
+            </a:extLst>
+          </p:cNvPr>
+          <p:cNvGrpSpPr/>
+          <p:nvPr/>
+        </p:nvGrpSpPr>
+        <p:grpSpPr>
+          <a:xfrm>
+            <a:off x="342358" y="42006"/>
+            <a:ext cx="8459283" cy="731036"/>
+            <a:chOff x="342358" y="42006"/>
+            <a:chExt cx="8459283" cy="731036"/>
+          </a:xfrm>
+        </p:grpSpPr>
+        <p:pic>
+          <p:nvPicPr>
+            <p:cNvPr id="7" name="Imagem 6">
+              <a:extLst>
+                <a:ext uri="{FF2B5EF4-FFF2-40B4-BE49-F238E27FC236}">
+                  <a16:creationId xmlns:a16="http://schemas.microsoft.com/office/drawing/2014/main" id="{81677A8A-DA4A-4C9A-90F9-A1A87F33632C}"/>
+                </a:ext>
+              </a:extLst>
+            </p:cNvPr>
+            <p:cNvPicPr>
+              <a:picLocks noChangeAspect="1"/>
+            </p:cNvPicPr>
+            <p:nvPr/>
+          </p:nvPicPr>
+          <p:blipFill>
+            <a:blip r:embed="rId2" r:link="rId3">
+              <a:extLst>
+                <a:ext uri="{28A0092B-C50C-407E-A947-70E740481C1C}">
+                  <a14:useLocalDpi xmlns:a14="http://schemas.microsoft.com/office/drawing/2010/main" val="0"/>
+                </a:ext>
+              </a:extLst>
+            </a:blip>
+            <a:stretch>
+              <a:fillRect/>
+            </a:stretch>
+          </p:blipFill>
+          <p:spPr>
+            <a:xfrm>
+              <a:off x="342358" y="42006"/>
+              <a:ext cx="974714" cy="731036"/>
+            </a:xfrm>
+            <a:prstGeom prst="rect">
+              <a:avLst/>
+            </a:prstGeom>
+          </p:spPr>
+        </p:pic>
+        <p:sp>
+          <p:nvSpPr>
+            <p:cNvPr id="8" name="CaixaDeTexto 7">
+              <a:extLst>
+                <a:ext uri="{FF2B5EF4-FFF2-40B4-BE49-F238E27FC236}">
+                  <a16:creationId xmlns:a16="http://schemas.microsoft.com/office/drawing/2014/main" id="{96E3142D-CAD8-424E-A180-28D52A1B91C6}"/>
+                </a:ext>
+              </a:extLst>
+            </p:cNvPr>
+            <p:cNvSpPr txBox="1"/>
+            <p:nvPr/>
+          </p:nvSpPr>
+          <p:spPr>
+            <a:xfrm>
+              <a:off x="1233182" y="134692"/>
+              <a:ext cx="2614818" cy="461665"/>
+            </a:xfrm>
+            <a:prstGeom prst="rect">
+              <a:avLst/>
+            </a:prstGeom>
+            <a:noFill/>
+          </p:spPr>
+          <p:txBody>
+            <a:bodyPr wrap="none" rtlCol="0">
+              <a:spAutoFit/>
+            </a:bodyPr>
+            <a:lstStyle/>
+            <a:p>
+              <a:r>
+                <a:rPr lang="pt-BR" sz="800" b="1" dirty="0">
+                  <a:solidFill>
+                    <a:schemeClr val="accent6">
+                      <a:lumMod val="75000"/>
+                    </a:schemeClr>
+                  </a:solidFill>
+                  <a:latin typeface="Arial" panose="020B0604020202020204" pitchFamily="34" charset="0"/>
+                  <a:cs typeface="Arial" panose="020B0604020202020204" pitchFamily="34" charset="0"/>
+                </a:rPr>
+                <a:t>IBMR - Projeto Final</a:t>
+              </a:r>
+              <a:br>
+                <a:rPr lang="pt-BR" sz="800" dirty="0">
+                  <a:solidFill>
+                    <a:schemeClr val="accent6">
+                      <a:lumMod val="75000"/>
+                    </a:schemeClr>
+                  </a:solidFill>
+                  <a:latin typeface="Arial" panose="020B0604020202020204" pitchFamily="34" charset="0"/>
+                  <a:cs typeface="Arial" panose="020B0604020202020204" pitchFamily="34" charset="0"/>
+                </a:rPr>
+              </a:br>
+              <a:r>
+                <a:rPr lang="pt-BR" sz="800" b="1" dirty="0">
+                  <a:solidFill>
+                    <a:schemeClr val="accent6">
+                      <a:lumMod val="75000"/>
+                    </a:schemeClr>
+                  </a:solidFill>
+                  <a:latin typeface="Arial" panose="020B0604020202020204" pitchFamily="34" charset="0"/>
+                  <a:cs typeface="Arial" panose="020B0604020202020204" pitchFamily="34" charset="0"/>
+                </a:rPr>
+                <a:t>Curso de Análise e Desenvolvimento de sistemas</a:t>
+              </a:r>
+            </a:p>
+            <a:p>
+              <a:r>
+                <a:rPr lang="pt-BR" sz="800" b="1" dirty="0">
+                  <a:solidFill>
+                    <a:schemeClr val="accent6">
+                      <a:lumMod val="75000"/>
+                    </a:schemeClr>
+                  </a:solidFill>
+                  <a:latin typeface="Arial" panose="020B0604020202020204" pitchFamily="34" charset="0"/>
+                  <a:cs typeface="Arial" panose="020B0604020202020204" pitchFamily="34" charset="0"/>
+                </a:rPr>
+                <a:t>CADERNO DE TESTES AUTOMATIZADO</a:t>
+              </a:r>
+              <a:endParaRPr lang="pt-BR" sz="800" dirty="0">
+                <a:solidFill>
+                  <a:schemeClr val="accent6">
+                    <a:lumMod val="75000"/>
+                  </a:schemeClr>
+                </a:solidFill>
+                <a:latin typeface="Arial" panose="020B0604020202020204" pitchFamily="34" charset="0"/>
+                <a:cs typeface="Arial" panose="020B0604020202020204" pitchFamily="34" charset="0"/>
+              </a:endParaRPr>
+            </a:p>
+          </p:txBody>
+        </p:sp>
+        <p:sp>
+          <p:nvSpPr>
+            <p:cNvPr id="9" name="CaixaDeTexto 8">
+              <a:extLst>
+                <a:ext uri="{FF2B5EF4-FFF2-40B4-BE49-F238E27FC236}">
+                  <a16:creationId xmlns:a16="http://schemas.microsoft.com/office/drawing/2014/main" id="{511A8D88-4276-44AD-94BA-32D910645A52}"/>
+                </a:ext>
+              </a:extLst>
+            </p:cNvPr>
+            <p:cNvSpPr txBox="1"/>
+            <p:nvPr/>
+          </p:nvSpPr>
+          <p:spPr>
+            <a:xfrm>
+              <a:off x="1233182" y="511432"/>
+              <a:ext cx="3284874" cy="261610"/>
+            </a:xfrm>
+            <a:prstGeom prst="rect">
+              <a:avLst/>
+            </a:prstGeom>
+            <a:noFill/>
+          </p:spPr>
+          <p:txBody>
+            <a:bodyPr wrap="none" rtlCol="0">
+              <a:spAutoFit/>
+            </a:bodyPr>
+            <a:lstStyle/>
+            <a:p>
+              <a:r>
+                <a:rPr lang="pt-BR" sz="1100" b="1" dirty="0">
+                  <a:latin typeface="Arial" panose="020B0604020202020204" pitchFamily="34" charset="0"/>
+                  <a:cs typeface="Arial" panose="020B0604020202020204" pitchFamily="34" charset="0"/>
+                </a:rPr>
+                <a:t>SGEP - Sistema de Gestão de Escalas e Ponto</a:t>
+              </a:r>
+              <a:endParaRPr lang="pt-BR" sz="1100" dirty="0">
+                <a:latin typeface="Arial" panose="020B0604020202020204" pitchFamily="34" charset="0"/>
+                <a:cs typeface="Arial" panose="020B0604020202020204" pitchFamily="34" charset="0"/>
+              </a:endParaRPr>
+            </a:p>
+          </p:txBody>
+        </p:sp>
+        <p:sp>
+          <p:nvSpPr>
+            <p:cNvPr id="10" name="CaixaDeTexto 9">
+              <a:extLst>
+                <a:ext uri="{FF2B5EF4-FFF2-40B4-BE49-F238E27FC236}">
+                  <a16:creationId xmlns:a16="http://schemas.microsoft.com/office/drawing/2014/main" id="{FC779BDC-B2A7-4196-B424-F6A5BF34C4A6}"/>
+                </a:ext>
+              </a:extLst>
+            </p:cNvPr>
+            <p:cNvSpPr txBox="1"/>
+            <p:nvPr/>
+          </p:nvSpPr>
+          <p:spPr>
+            <a:xfrm>
+              <a:off x="7183890" y="461142"/>
+              <a:ext cx="1617751" cy="246221"/>
+            </a:xfrm>
+            <a:prstGeom prst="rect">
+              <a:avLst/>
+            </a:prstGeom>
+            <a:noFill/>
+          </p:spPr>
+          <p:txBody>
+            <a:bodyPr wrap="none" rtlCol="0">
+              <a:spAutoFit/>
+            </a:bodyPr>
+            <a:lstStyle/>
+            <a:p>
+              <a:pPr algn="r"/>
+              <a:r>
+                <a:rPr lang="pt-BR" sz="1000" dirty="0">
+                  <a:latin typeface="Arial" panose="020B0604020202020204" pitchFamily="34" charset="0"/>
+                  <a:cs typeface="Arial" panose="020B0604020202020204" pitchFamily="34" charset="0"/>
+                </a:rPr>
+                <a:t>IBMR - GRUPO 1 2020.2</a:t>
+              </a:r>
+            </a:p>
+          </p:txBody>
+        </p:sp>
+      </p:grpSp>
       <p:pic>
         <p:nvPicPr>
           <p:cNvPr id="23" name="Imagem 22">
@@ -5288,7 +8236,7 @@
         </p:blipFill>
         <p:spPr>
           <a:xfrm>
-            <a:off x="342358" y="3069885"/>
+            <a:off x="324116" y="3106890"/>
             <a:ext cx="1758153" cy="2492247"/>
           </a:xfrm>
           <a:prstGeom prst="rect">
@@ -5318,7 +8266,7 @@
         </p:blipFill>
         <p:spPr>
           <a:xfrm>
-            <a:off x="2916170" y="2158844"/>
+            <a:off x="2837915" y="1450620"/>
             <a:ext cx="1945305" cy="2239553"/>
           </a:xfrm>
           <a:prstGeom prst="rect">
@@ -5348,7 +8296,7 @@
         </p:blipFill>
         <p:spPr>
           <a:xfrm>
-            <a:off x="5333433" y="2158844"/>
+            <a:off x="5333433" y="1459417"/>
             <a:ext cx="1976559" cy="2239552"/>
           </a:xfrm>
           <a:prstGeom prst="rect">
@@ -5378,7 +8326,7 @@
         </p:blipFill>
         <p:spPr>
           <a:xfrm>
-            <a:off x="5364687" y="4581140"/>
+            <a:off x="5390537" y="4517061"/>
             <a:ext cx="1945305" cy="2164152"/>
           </a:xfrm>
           <a:prstGeom prst="rect">
@@ -5416,49 +8364,6 @@
           </a:prstGeom>
         </p:spPr>
       </p:pic>
-      <p:sp>
-        <p:nvSpPr>
-          <p:cNvPr id="20" name="CaixaDeTexto 19">
-            <a:extLst>
-              <a:ext uri="{FF2B5EF4-FFF2-40B4-BE49-F238E27FC236}">
-                <a16:creationId xmlns:a16="http://schemas.microsoft.com/office/drawing/2014/main" id="{C8D1DB92-AC4B-4A26-8D8B-BA8636A0F70E}"/>
-              </a:ext>
-            </a:extLst>
-          </p:cNvPr>
-          <p:cNvSpPr txBox="1"/>
-          <p:nvPr/>
-        </p:nvSpPr>
-        <p:spPr>
-          <a:xfrm>
-            <a:off x="255950" y="2127566"/>
-            <a:ext cx="1326004" cy="307777"/>
-          </a:xfrm>
-          <a:prstGeom prst="rect">
-            <a:avLst/>
-          </a:prstGeom>
-          <a:noFill/>
-        </p:spPr>
-        <p:txBody>
-          <a:bodyPr wrap="none" rtlCol="0">
-            <a:spAutoFit/>
-          </a:bodyPr>
-          <a:lstStyle/>
-          <a:p>
-            <a:r>
-              <a:rPr lang="pt-BR" sz="1400" b="1" dirty="0">
-                <a:solidFill>
-                  <a:schemeClr val="accent6">
-                    <a:lumMod val="50000"/>
-                  </a:schemeClr>
-                </a:solidFill>
-                <a:latin typeface="Arial" panose="020B0604020202020204" pitchFamily="34" charset="0"/>
-                <a:cs typeface="Arial" panose="020B0604020202020204" pitchFamily="34" charset="0"/>
-              </a:rPr>
-              <a:t>Continuação:</a:t>
-            </a:r>
-          </a:p>
-        </p:txBody>
-      </p:sp>
       <p:cxnSp>
         <p:nvCxnSpPr>
           <p:cNvPr id="5" name="Conector de Seta Reta 4">
@@ -5515,7 +8420,7 @@
         </p:nvSpPr>
         <p:spPr>
           <a:xfrm>
-            <a:off x="4869547" y="3278620"/>
+            <a:off x="4796248" y="2633129"/>
             <a:ext cx="463886" cy="333260"/>
           </a:xfrm>
           <a:prstGeom prst="rightArrow">
@@ -5654,6 +8559,131 @@
           </a:p>
         </p:txBody>
       </p:sp>
+      <p:sp>
+        <p:nvSpPr>
+          <p:cNvPr id="21" name="CaixaDeTexto 20">
+            <a:extLst>
+              <a:ext uri="{FF2B5EF4-FFF2-40B4-BE49-F238E27FC236}">
+                <a16:creationId xmlns:a16="http://schemas.microsoft.com/office/drawing/2014/main" id="{700DDE85-568A-4210-A9CD-5DAD43EB4230}"/>
+              </a:ext>
+            </a:extLst>
+          </p:cNvPr>
+          <p:cNvSpPr txBox="1"/>
+          <p:nvPr/>
+        </p:nvSpPr>
+        <p:spPr>
+          <a:xfrm>
+            <a:off x="219234" y="758444"/>
+            <a:ext cx="5004896" cy="307777"/>
+          </a:xfrm>
+          <a:prstGeom prst="rect">
+            <a:avLst/>
+          </a:prstGeom>
+          <a:noFill/>
+        </p:spPr>
+        <p:txBody>
+          <a:bodyPr wrap="none" rtlCol="0">
+            <a:spAutoFit/>
+          </a:bodyPr>
+          <a:lstStyle/>
+          <a:p>
+            <a:r>
+              <a:rPr lang="pt-BR" sz="1400" b="1" dirty="0">
+                <a:solidFill>
+                  <a:schemeClr val="accent6">
+                    <a:lumMod val="50000"/>
+                  </a:schemeClr>
+                </a:solidFill>
+                <a:latin typeface="Arial" panose="020B0604020202020204" pitchFamily="34" charset="0"/>
+                <a:cs typeface="Arial" panose="020B0604020202020204" pitchFamily="34" charset="0"/>
+              </a:rPr>
+              <a:t>TC03 – Registro de entrada e saída (Registro de jornada)</a:t>
+            </a:r>
+          </a:p>
+        </p:txBody>
+      </p:sp>
+      <p:sp>
+        <p:nvSpPr>
+          <p:cNvPr id="22" name="CaixaDeTexto 21">
+            <a:extLst>
+              <a:ext uri="{FF2B5EF4-FFF2-40B4-BE49-F238E27FC236}">
+                <a16:creationId xmlns:a16="http://schemas.microsoft.com/office/drawing/2014/main" id="{95F5A04D-F071-4C80-82BD-B515443AB3A3}"/>
+              </a:ext>
+            </a:extLst>
+          </p:cNvPr>
+          <p:cNvSpPr txBox="1"/>
+          <p:nvPr/>
+        </p:nvSpPr>
+        <p:spPr>
+          <a:xfrm>
+            <a:off x="4220918" y="1142843"/>
+            <a:ext cx="1614545" cy="307777"/>
+          </a:xfrm>
+          <a:prstGeom prst="rect">
+            <a:avLst/>
+          </a:prstGeom>
+          <a:noFill/>
+        </p:spPr>
+        <p:txBody>
+          <a:bodyPr wrap="none" rtlCol="0">
+            <a:spAutoFit/>
+          </a:bodyPr>
+          <a:lstStyle/>
+          <a:p>
+            <a:r>
+              <a:rPr lang="pt-BR" sz="1400" b="1" dirty="0">
+                <a:solidFill>
+                  <a:srgbClr val="00B0F0"/>
+                </a:solidFill>
+                <a:latin typeface="Arial" panose="020B0604020202020204" pitchFamily="34" charset="0"/>
+                <a:cs typeface="Arial" panose="020B0604020202020204" pitchFamily="34" charset="0"/>
+              </a:rPr>
+              <a:t>Fluxo de entrada</a:t>
+            </a:r>
+          </a:p>
+        </p:txBody>
+      </p:sp>
+      <p:sp>
+        <p:nvSpPr>
+          <p:cNvPr id="28" name="CaixaDeTexto 27">
+            <a:extLst>
+              <a:ext uri="{FF2B5EF4-FFF2-40B4-BE49-F238E27FC236}">
+                <a16:creationId xmlns:a16="http://schemas.microsoft.com/office/drawing/2014/main" id="{E6B6F49E-FE92-4741-94A1-94DA44DC4485}"/>
+              </a:ext>
+            </a:extLst>
+          </p:cNvPr>
+          <p:cNvSpPr txBox="1"/>
+          <p:nvPr/>
+        </p:nvSpPr>
+        <p:spPr>
+          <a:xfrm>
+            <a:off x="4315495" y="4124888"/>
+            <a:ext cx="1425390" cy="307777"/>
+          </a:xfrm>
+          <a:prstGeom prst="rect">
+            <a:avLst/>
+          </a:prstGeom>
+          <a:noFill/>
+        </p:spPr>
+        <p:txBody>
+          <a:bodyPr wrap="none" rtlCol="0">
+            <a:spAutoFit/>
+          </a:bodyPr>
+          <a:lstStyle/>
+          <a:p>
+            <a:r>
+              <a:rPr lang="pt-BR" sz="1400" b="1" dirty="0">
+                <a:solidFill>
+                  <a:srgbClr val="FF0000"/>
+                </a:solidFill>
+                <a:latin typeface="Arial" panose="020B0604020202020204" pitchFamily="34" charset="0"/>
+                <a:cs typeface="Arial" panose="020B0604020202020204" pitchFamily="34" charset="0"/>
+              </a:rPr>
+              <a:t>Fluxo de saída</a:t>
+            </a:r>
+          </a:p>
+        </p:txBody>
+      </p:sp>
     </p:spTree>
     <p:extLst>
       <p:ext uri="{BB962C8B-B14F-4D97-AF65-F5344CB8AC3E}">
@@ -5667,7 +8697,7 @@
 </p:sld>
 </file>
 
-<file path=ppt/slides/slide5.xml><?xml version="1.0" encoding="utf-8"?>
+<file path=ppt/slides/slide8.xml><?xml version="1.0" encoding="utf-8"?>
 <p:sld xmlns:a="http://schemas.openxmlformats.org/drawingml/2006/main" xmlns:r="http://schemas.openxmlformats.org/officeDocument/2006/relationships" xmlns:p="http://schemas.openxmlformats.org/presentationml/2006/main">
   <p:cSld>
     <p:spTree>
@@ -5926,7 +8956,7 @@
         <p:spPr>
           <a:xfrm>
             <a:off x="349113" y="1414326"/>
-            <a:ext cx="731290" cy="307777"/>
+            <a:ext cx="889987" cy="369332"/>
           </a:xfrm>
           <a:prstGeom prst="rect">
             <a:avLst/>
@@ -5940,7 +8970,7 @@
           <a:lstStyle/>
           <a:p>
             <a:r>
-              <a:rPr lang="pt-BR" sz="1400" b="1" dirty="0">
+              <a:rPr lang="pt-BR" b="1" dirty="0">
                 <a:solidFill>
                   <a:schemeClr val="accent6">
                     <a:lumMod val="50000"/>

</xml_diff>